<commit_message>
Added class diagram for refactor1
</commit_message>
<xml_diff>
--- a/SOLID - SRP-DIP.pptx
+++ b/SOLID - SRP-DIP.pptx
@@ -5,10 +5,10 @@
     <p:sldMasterId id="2147483648" r:id="rId5"/>
   </p:sldMasterIdLst>
   <p:notesMasterIdLst>
-    <p:notesMasterId r:id="rId31"/>
+    <p:notesMasterId r:id="rId32"/>
   </p:notesMasterIdLst>
   <p:handoutMasterIdLst>
-    <p:handoutMasterId r:id="rId32"/>
+    <p:handoutMasterId r:id="rId33"/>
   </p:handoutMasterIdLst>
   <p:sldIdLst>
     <p:sldId id="256" r:id="rId6"/>
@@ -35,7 +35,8 @@
     <p:sldId id="322" r:id="rId27"/>
     <p:sldId id="326" r:id="rId28"/>
     <p:sldId id="323" r:id="rId29"/>
-    <p:sldId id="324" r:id="rId30"/>
+    <p:sldId id="327" r:id="rId30"/>
+    <p:sldId id="324" r:id="rId31"/>
   </p:sldIdLst>
   <p:sldSz cx="9144000" cy="6858000" type="screen4x3"/>
   <p:notesSz cx="6858000" cy="9144000"/>
@@ -280,7 +281,7 @@
             <a:fld id="{30BDBCCB-F02B-5948-960F-FA57E5A2C110}" type="datetimeFigureOut">
               <a:rPr lang="en-US" smtClean="0"/>
               <a:pPr/>
-              <a:t>3/24/2015</a:t>
+              <a:t>3/25/2015</a:t>
             </a:fld>
             <a:endParaRPr lang="en-US"/>
           </a:p>
@@ -448,7 +449,7 @@
             <a:fld id="{28EB9C19-8F4E-5D44-AF31-D0E24F8C4820}" type="datetimeFigureOut">
               <a:rPr lang="en-US" smtClean="0"/>
               <a:pPr/>
-              <a:t>3/24/2015</a:t>
+              <a:t>3/25/2015</a:t>
             </a:fld>
             <a:endParaRPr lang="en-US"/>
           </a:p>
@@ -3852,7 +3853,7 @@
           <a:p>
             <a:fld id="{222D361C-D57E-4133-91D5-68918140FCBD}" type="datetimeFigureOut">
               <a:rPr lang="nb-NO" smtClean="0"/>
-              <a:t>24.03.2015</a:t>
+              <a:t>25.03.2015</a:t>
             </a:fld>
             <a:endParaRPr lang="nb-NO"/>
           </a:p>
@@ -11114,11 +11115,7 @@
             </a:r>
             <a:r>
               <a:rPr lang="nb-NO" dirty="0" smtClean="0"/>
-              <a:t> slik at SRP </a:t>
-            </a:r>
-            <a:r>
-              <a:rPr lang="nb-NO" dirty="0" smtClean="0"/>
-              <a:t>overholdes</a:t>
+              <a:t> slik at SRP overholdes</a:t>
             </a:r>
           </a:p>
           <a:p>
@@ -11152,7 +11149,6 @@
               <a:rPr lang="nb-NO" dirty="0" smtClean="0"/>
               <a:t>Skill ut de forskjellige oppgavene i separate klasser</a:t>
             </a:r>
-            <a:endParaRPr lang="nb-NO" dirty="0" smtClean="0"/>
           </a:p>
         </p:txBody>
       </p:sp>
@@ -11251,47 +11247,7 @@
       </p:grpSpPr>
       <p:sp>
         <p:nvSpPr>
-          <p:cNvPr id="2" name="Plassholder for innhold 1"/>
-          <p:cNvSpPr>
-            <a:spLocks noGrp="1"/>
-          </p:cNvSpPr>
-          <p:nvPr>
-            <p:ph idx="1"/>
-          </p:nvPr>
-        </p:nvSpPr>
-        <p:spPr/>
-        <p:txBody>
-          <a:bodyPr/>
-          <a:lstStyle/>
-          <a:p>
-            <a:r>
-              <a:rPr lang="nb-NO" dirty="0" smtClean="0"/>
-              <a:t>Ta utgangspunkt i prosjektet ‘Refactor1’</a:t>
-            </a:r>
-          </a:p>
-          <a:p>
-            <a:pPr lvl="1"/>
-            <a:r>
-              <a:rPr lang="nb-NO" dirty="0" smtClean="0"/>
-              <a:t>(som er «fasit» for oppgave 1)</a:t>
-            </a:r>
-          </a:p>
-          <a:p>
-            <a:r>
-              <a:rPr lang="nb-NO" dirty="0" err="1" smtClean="0"/>
-              <a:t>Refaktoriser</a:t>
-            </a:r>
-            <a:r>
-              <a:rPr lang="nb-NO" dirty="0" smtClean="0"/>
-              <a:t> slik at DIP overholdes</a:t>
-            </a:r>
-            <a:endParaRPr lang="nb-NO" dirty="0"/>
-          </a:p>
-        </p:txBody>
-      </p:sp>
-      <p:sp>
-        <p:nvSpPr>
-          <p:cNvPr id="3" name="Plassholder for lysbildenummer 2"/>
+          <p:cNvPr id="3" name="Slide Number Placeholder 2"/>
           <p:cNvSpPr>
             <a:spLocks noGrp="1"/>
           </p:cNvSpPr>
@@ -11308,6 +11264,161 @@
               <a:rPr lang="en-US" smtClean="0"/>
               <a:pPr/>
               <a:t>25</a:t>
+            </a:fld>
+            <a:endParaRPr lang="en-US" dirty="0"/>
+          </a:p>
+        </p:txBody>
+      </p:sp>
+      <p:sp>
+        <p:nvSpPr>
+          <p:cNvPr id="4" name="Title 3"/>
+          <p:cNvSpPr>
+            <a:spLocks noGrp="1"/>
+          </p:cNvSpPr>
+          <p:nvPr>
+            <p:ph type="title"/>
+          </p:nvPr>
+        </p:nvSpPr>
+        <p:spPr/>
+        <p:txBody>
+          <a:bodyPr/>
+          <a:lstStyle/>
+          <a:p>
+            <a:r>
+              <a:rPr lang="nb-NO" dirty="0" smtClean="0"/>
+              <a:t>Etter </a:t>
+            </a:r>
+            <a:r>
+              <a:rPr lang="nb-NO" dirty="0" err="1" smtClean="0"/>
+              <a:t>refaktorisering</a:t>
+            </a:r>
+            <a:r>
+              <a:rPr lang="nb-NO" dirty="0" smtClean="0"/>
+              <a:t> - SRP</a:t>
+            </a:r>
+            <a:endParaRPr lang="nb-NO" dirty="0"/>
+          </a:p>
+        </p:txBody>
+      </p:sp>
+      <p:pic>
+        <p:nvPicPr>
+          <p:cNvPr id="5" name="Picture 4"/>
+          <p:cNvPicPr>
+            <a:picLocks noChangeAspect="1"/>
+          </p:cNvPicPr>
+          <p:nvPr/>
+        </p:nvPicPr>
+        <p:blipFill>
+          <a:blip r:embed="rId2">
+            <a:extLst>
+              <a:ext uri="{28A0092B-C50C-407E-A947-70E740481C1C}">
+                <a14:useLocalDpi xmlns:a14="http://schemas.microsoft.com/office/drawing/2010/main" val="0"/>
+              </a:ext>
+            </a:extLst>
+          </a:blip>
+          <a:stretch>
+            <a:fillRect/>
+          </a:stretch>
+        </p:blipFill>
+        <p:spPr>
+          <a:xfrm>
+            <a:off x="0" y="1340768"/>
+            <a:ext cx="9144000" cy="5061025"/>
+          </a:xfrm>
+          <a:prstGeom prst="rect">
+            <a:avLst/>
+          </a:prstGeom>
+        </p:spPr>
+      </p:pic>
+    </p:spTree>
+    <p:extLst>
+      <p:ext uri="{BB962C8B-B14F-4D97-AF65-F5344CB8AC3E}">
+        <p14:creationId xmlns:p14="http://schemas.microsoft.com/office/powerpoint/2010/main" val="1253313371"/>
+      </p:ext>
+    </p:extLst>
+  </p:cSld>
+  <p:clrMapOvr>
+    <a:masterClrMapping/>
+  </p:clrMapOvr>
+</p:sld>
+</file>
+
+<file path=ppt/slides/slide26.xml><?xml version="1.0" encoding="utf-8"?>
+<p:sld xmlns:a="http://schemas.openxmlformats.org/drawingml/2006/main" xmlns:r="http://schemas.openxmlformats.org/officeDocument/2006/relationships" xmlns:p="http://schemas.openxmlformats.org/presentationml/2006/main">
+  <p:cSld>
+    <p:spTree>
+      <p:nvGrpSpPr>
+        <p:cNvPr id="1" name=""/>
+        <p:cNvGrpSpPr/>
+        <p:nvPr/>
+      </p:nvGrpSpPr>
+      <p:grpSpPr>
+        <a:xfrm>
+          <a:off x="0" y="0"/>
+          <a:ext cx="0" cy="0"/>
+          <a:chOff x="0" y="0"/>
+          <a:chExt cx="0" cy="0"/>
+        </a:xfrm>
+      </p:grpSpPr>
+      <p:sp>
+        <p:nvSpPr>
+          <p:cNvPr id="2" name="Plassholder for innhold 1"/>
+          <p:cNvSpPr>
+            <a:spLocks noGrp="1"/>
+          </p:cNvSpPr>
+          <p:nvPr>
+            <p:ph idx="1"/>
+          </p:nvPr>
+        </p:nvSpPr>
+        <p:spPr/>
+        <p:txBody>
+          <a:bodyPr/>
+          <a:lstStyle/>
+          <a:p>
+            <a:r>
+              <a:rPr lang="nb-NO" dirty="0" smtClean="0"/>
+              <a:t>Ta utgangspunkt i prosjektet ‘Refactor1’</a:t>
+            </a:r>
+          </a:p>
+          <a:p>
+            <a:pPr lvl="1"/>
+            <a:r>
+              <a:rPr lang="nb-NO" dirty="0" smtClean="0"/>
+              <a:t>(som er «fasit» for oppgave 1)</a:t>
+            </a:r>
+          </a:p>
+          <a:p>
+            <a:r>
+              <a:rPr lang="nb-NO" dirty="0" err="1" smtClean="0"/>
+              <a:t>Refaktoriser</a:t>
+            </a:r>
+            <a:r>
+              <a:rPr lang="nb-NO" dirty="0" smtClean="0"/>
+              <a:t> slik at DIP overholdes</a:t>
+            </a:r>
+            <a:endParaRPr lang="nb-NO" dirty="0"/>
+          </a:p>
+        </p:txBody>
+      </p:sp>
+      <p:sp>
+        <p:nvSpPr>
+          <p:cNvPr id="3" name="Plassholder for lysbildenummer 2"/>
+          <p:cNvSpPr>
+            <a:spLocks noGrp="1"/>
+          </p:cNvSpPr>
+          <p:nvPr>
+            <p:ph type="sldNum" sz="quarter" idx="11"/>
+          </p:nvPr>
+        </p:nvSpPr>
+        <p:spPr/>
+        <p:txBody>
+          <a:bodyPr/>
+          <a:lstStyle/>
+          <a:p>
+            <a:fld id="{6C43C368-B4F5-3E41-AC60-B61C23CF3503}" type="slidenum">
+              <a:rPr lang="en-US" smtClean="0"/>
+              <a:pPr/>
+              <a:t>26</a:t>
             </a:fld>
             <a:endParaRPr lang="en-US" dirty="0"/>
           </a:p>
@@ -14190,15 +14301,6 @@
 
 <file path=customXml/item1.xml><?xml version="1.0" encoding="utf-8"?>
 <?mso-contentType ?>
-<FormTemplates xmlns="http://schemas.microsoft.com/sharepoint/v3/contenttype/forms">
-  <Display>DocumentLibraryForm</Display>
-  <Edit>DocumentLibraryForm</Edit>
-  <New>DocumentLibraryForm</New>
-</FormTemplates>
-</file>
-
-<file path=customXml/item2.xml><?xml version="1.0" encoding="utf-8"?>
-<?mso-contentType ?>
 <spe:Receivers xmlns:spe="http://schemas.microsoft.com/sharepoint/events">
   <Receiver>
     <Name>Document ID Generator</Name>
@@ -14243,7 +14345,30 @@
 </spe:Receivers>
 </file>
 
+<file path=customXml/item2.xml><?xml version="1.0" encoding="utf-8"?>
+<?mso-contentType ?>
+<FormTemplates xmlns="http://schemas.microsoft.com/sharepoint/v3/contenttype/forms">
+  <Display>DocumentLibraryForm</Display>
+  <Edit>DocumentLibraryForm</Edit>
+  <New>DocumentLibraryForm</New>
+</FormTemplates>
+</file>
+
 <file path=customXml/item3.xml><?xml version="1.0" encoding="utf-8"?>
+<p:properties xmlns:p="http://schemas.microsoft.com/office/2006/metadata/properties" xmlns:xsi="http://www.w3.org/2001/XMLSchema-instance" xmlns:pc="http://schemas.microsoft.com/office/infopath/2007/PartnerControls">
+  <documentManagement>
+    <_dlc_DocId xmlns="cd7095a3-97f1-4663-a71f-a762e9d8a5de">FK7UAMZMK7QV-3061-47</_dlc_DocId>
+    <_dlc_DocIdUrl xmlns="cd7095a3-97f1-4663-a71f-a762e9d8a5de">
+      <Url>https://pingvinen.bouvet.no/stotte/dokumentmaler/_layouts/DocIdRedir.aspx?ID=FK7UAMZMK7QV-3061-47</Url>
+      <Description>FK7UAMZMK7QV-3061-47</Description>
+    </_dlc_DocIdUrl>
+    <PublishingExpirationDate xmlns="http://schemas.microsoft.com/sharepoint/v3" xsi:nil="true"/>
+    <PublishingStartDate xmlns="http://schemas.microsoft.com/sharepoint/v3" xsi:nil="true"/>
+  </documentManagement>
+</p:properties>
+</file>
+
+<file path=customXml/item4.xml><?xml version="1.0" encoding="utf-8"?>
 <ct:contentTypeSchema xmlns:ct="http://schemas.microsoft.com/office/2006/metadata/contentType" xmlns:ma="http://schemas.microsoft.com/office/2006/metadata/properties/metaAttributes" ct:_="" ma:_="" ma:contentTypeName="Document" ma:contentTypeID="0x0101006DE77A4C69F7B04F983EB828CF8C5433" ma:contentTypeVersion="2" ma:contentTypeDescription="Create a new document." ma:contentTypeScope="" ma:versionID="3f88a36eb5d68a1319bea6a26a0634f9">
   <xsd:schema xmlns:xsd="http://www.w3.org/2001/XMLSchema" xmlns:xs="http://www.w3.org/2001/XMLSchema" xmlns:p="http://schemas.microsoft.com/office/2006/metadata/properties" xmlns:ns1="http://schemas.microsoft.com/sharepoint/v3" xmlns:ns2="cd7095a3-97f1-4663-a71f-a762e9d8a5de" targetNamespace="http://schemas.microsoft.com/office/2006/metadata/properties" ma:root="true" ma:fieldsID="12e73613dd42fd77c3af4275080e49b8" ns1:_="" ns2:_="">
     <xsd:import namespace="http://schemas.microsoft.com/sharepoint/v3"/>
@@ -14405,21 +14530,15 @@
 </ct:contentTypeSchema>
 </file>
 
-<file path=customXml/item4.xml><?xml version="1.0" encoding="utf-8"?>
-<p:properties xmlns:p="http://schemas.microsoft.com/office/2006/metadata/properties" xmlns:xsi="http://www.w3.org/2001/XMLSchema-instance" xmlns:pc="http://schemas.microsoft.com/office/infopath/2007/PartnerControls">
-  <documentManagement>
-    <_dlc_DocId xmlns="cd7095a3-97f1-4663-a71f-a762e9d8a5de">FK7UAMZMK7QV-3061-47</_dlc_DocId>
-    <_dlc_DocIdUrl xmlns="cd7095a3-97f1-4663-a71f-a762e9d8a5de">
-      <Url>https://pingvinen.bouvet.no/stotte/dokumentmaler/_layouts/DocIdRedir.aspx?ID=FK7UAMZMK7QV-3061-47</Url>
-      <Description>FK7UAMZMK7QV-3061-47</Description>
-    </_dlc_DocIdUrl>
-    <PublishingExpirationDate xmlns="http://schemas.microsoft.com/sharepoint/v3" xsi:nil="true"/>
-    <PublishingStartDate xmlns="http://schemas.microsoft.com/sharepoint/v3" xsi:nil="true"/>
-  </documentManagement>
-</p:properties>
+<file path=customXml/itemProps1.xml><?xml version="1.0" encoding="utf-8"?>
+<ds:datastoreItem xmlns:ds="http://schemas.openxmlformats.org/officeDocument/2006/customXml" ds:itemID="{95047315-98B4-402D-A094-92B291EC55D5}">
+  <ds:schemaRefs>
+    <ds:schemaRef ds:uri="http://schemas.microsoft.com/sharepoint/events"/>
+  </ds:schemaRefs>
+</ds:datastoreItem>
 </file>
 
-<file path=customXml/itemProps1.xml><?xml version="1.0" encoding="utf-8"?>
+<file path=customXml/itemProps2.xml><?xml version="1.0" encoding="utf-8"?>
 <ds:datastoreItem xmlns:ds="http://schemas.openxmlformats.org/officeDocument/2006/customXml" ds:itemID="{2AEC2C5E-0142-4DE9-A3D1-E1C3DD77BB73}">
   <ds:schemaRefs>
     <ds:schemaRef ds:uri="http://schemas.microsoft.com/sharepoint/v3/contenttype/forms"/>
@@ -14427,15 +14546,24 @@
 </ds:datastoreItem>
 </file>
 
-<file path=customXml/itemProps2.xml><?xml version="1.0" encoding="utf-8"?>
-<ds:datastoreItem xmlns:ds="http://schemas.openxmlformats.org/officeDocument/2006/customXml" ds:itemID="{95047315-98B4-402D-A094-92B291EC55D5}">
+<file path=customXml/itemProps3.xml><?xml version="1.0" encoding="utf-8"?>
+<ds:datastoreItem xmlns:ds="http://schemas.openxmlformats.org/officeDocument/2006/customXml" ds:itemID="{82784505-B6AE-42FB-A8A3-841C6312BFF2}">
   <ds:schemaRefs>
-    <ds:schemaRef ds:uri="http://schemas.microsoft.com/sharepoint/events"/>
+    <ds:schemaRef ds:uri="http://schemas.microsoft.com/office/2006/documentManagement/types"/>
+    <ds:schemaRef ds:uri="http://schemas.microsoft.com/office/infopath/2007/PartnerControls"/>
+    <ds:schemaRef ds:uri="cd7095a3-97f1-4663-a71f-a762e9d8a5de"/>
+    <ds:schemaRef ds:uri="http://purl.org/dc/elements/1.1/"/>
+    <ds:schemaRef ds:uri="http://schemas.microsoft.com/office/2006/metadata/properties"/>
+    <ds:schemaRef ds:uri="http://schemas.microsoft.com/sharepoint/v3"/>
+    <ds:schemaRef ds:uri="http://purl.org/dc/terms/"/>
+    <ds:schemaRef ds:uri="http://schemas.openxmlformats.org/package/2006/metadata/core-properties"/>
+    <ds:schemaRef ds:uri="http://www.w3.org/XML/1998/namespace"/>
+    <ds:schemaRef ds:uri="http://purl.org/dc/dcmitype/"/>
   </ds:schemaRefs>
 </ds:datastoreItem>
 </file>
 
-<file path=customXml/itemProps3.xml><?xml version="1.0" encoding="utf-8"?>
+<file path=customXml/itemProps4.xml><?xml version="1.0" encoding="utf-8"?>
 <ds:datastoreItem xmlns:ds="http://schemas.openxmlformats.org/officeDocument/2006/customXml" ds:itemID="{85C41887-34B0-475C-96EF-12649FBB6FA4}">
   <ds:schemaRefs>
     <ds:schemaRef ds:uri="http://schemas.microsoft.com/office/2006/metadata/contentType"/>
@@ -14450,23 +14578,6 @@
     <ds:schemaRef ds:uri="http://purl.org/dc/elements/1.1/"/>
     <ds:schemaRef ds:uri="http://purl.org/dc/terms/"/>
     <ds:schemaRef ds:uri="http://schemas.microsoft.com/internal/obd"/>
-  </ds:schemaRefs>
-</ds:datastoreItem>
-</file>
-
-<file path=customXml/itemProps4.xml><?xml version="1.0" encoding="utf-8"?>
-<ds:datastoreItem xmlns:ds="http://schemas.openxmlformats.org/officeDocument/2006/customXml" ds:itemID="{82784505-B6AE-42FB-A8A3-841C6312BFF2}">
-  <ds:schemaRefs>
-    <ds:schemaRef ds:uri="http://schemas.microsoft.com/office/2006/documentManagement/types"/>
-    <ds:schemaRef ds:uri="http://schemas.microsoft.com/office/infopath/2007/PartnerControls"/>
-    <ds:schemaRef ds:uri="cd7095a3-97f1-4663-a71f-a762e9d8a5de"/>
-    <ds:schemaRef ds:uri="http://purl.org/dc/elements/1.1/"/>
-    <ds:schemaRef ds:uri="http://schemas.microsoft.com/office/2006/metadata/properties"/>
-    <ds:schemaRef ds:uri="http://schemas.microsoft.com/sharepoint/v3"/>
-    <ds:schemaRef ds:uri="http://purl.org/dc/terms/"/>
-    <ds:schemaRef ds:uri="http://schemas.openxmlformats.org/package/2006/metadata/core-properties"/>
-    <ds:schemaRef ds:uri="http://www.w3.org/XML/1998/namespace"/>
-    <ds:schemaRef ds:uri="http://purl.org/dc/dcmitype/"/>
   </ds:schemaRefs>
 </ds:datastoreItem>
 </file>

</xml_diff>

<commit_message>
Added class diagram for C# post DI refactoring
</commit_message>
<xml_diff>
--- a/SOLID - SRP-DIP.pptx
+++ b/SOLID - SRP-DIP.pptx
@@ -5,10 +5,10 @@
     <p:sldMasterId id="2147483648" r:id="rId5"/>
   </p:sldMasterIdLst>
   <p:notesMasterIdLst>
-    <p:notesMasterId r:id="rId32"/>
+    <p:notesMasterId r:id="rId33"/>
   </p:notesMasterIdLst>
   <p:handoutMasterIdLst>
-    <p:handoutMasterId r:id="rId33"/>
+    <p:handoutMasterId r:id="rId34"/>
   </p:handoutMasterIdLst>
   <p:sldIdLst>
     <p:sldId id="256" r:id="rId6"/>
@@ -37,6 +37,7 @@
     <p:sldId id="323" r:id="rId29"/>
     <p:sldId id="327" r:id="rId30"/>
     <p:sldId id="324" r:id="rId31"/>
+    <p:sldId id="328" r:id="rId32"/>
   </p:sldIdLst>
   <p:sldSz cx="9144000" cy="6858000" type="screen4x3"/>
   <p:notesSz cx="6858000" cy="9144000"/>
@@ -10919,15 +10920,21 @@
           <p:nvPr/>
         </p:nvPicPr>
         <p:blipFill>
-          <a:blip r:embed="rId3"/>
+          <a:blip r:embed="rId3">
+            <a:extLst>
+              <a:ext uri="{28A0092B-C50C-407E-A947-70E740481C1C}">
+                <a14:useLocalDpi xmlns:a14="http://schemas.microsoft.com/office/drawing/2010/main" val="0"/>
+              </a:ext>
+            </a:extLst>
+          </a:blip>
           <a:stretch>
             <a:fillRect/>
           </a:stretch>
         </p:blipFill>
         <p:spPr>
           <a:xfrm>
-            <a:off x="5652119" y="2492896"/>
-            <a:ext cx="2546479" cy="3888432"/>
+            <a:off x="5728073" y="2492896"/>
+            <a:ext cx="2394570" cy="3888432"/>
           </a:xfrm>
           <a:prstGeom prst="rect">
             <a:avLst/>
@@ -11481,6 +11488,125 @@
       </p:par>
     </p:tnLst>
   </p:timing>
+</p:sld>
+</file>
+
+<file path=ppt/slides/slide27.xml><?xml version="1.0" encoding="utf-8"?>
+<p:sld xmlns:a="http://schemas.openxmlformats.org/drawingml/2006/main" xmlns:r="http://schemas.openxmlformats.org/officeDocument/2006/relationships" xmlns:p="http://schemas.openxmlformats.org/presentationml/2006/main">
+  <p:cSld>
+    <p:spTree>
+      <p:nvGrpSpPr>
+        <p:cNvPr id="1" name=""/>
+        <p:cNvGrpSpPr/>
+        <p:nvPr/>
+      </p:nvGrpSpPr>
+      <p:grpSpPr>
+        <a:xfrm>
+          <a:off x="0" y="0"/>
+          <a:ext cx="0" cy="0"/>
+          <a:chOff x="0" y="0"/>
+          <a:chExt cx="0" cy="0"/>
+        </a:xfrm>
+      </p:grpSpPr>
+      <p:sp>
+        <p:nvSpPr>
+          <p:cNvPr id="3" name="Slide Number Placeholder 2"/>
+          <p:cNvSpPr>
+            <a:spLocks noGrp="1"/>
+          </p:cNvSpPr>
+          <p:nvPr>
+            <p:ph type="sldNum" sz="quarter" idx="11"/>
+          </p:nvPr>
+        </p:nvSpPr>
+        <p:spPr/>
+        <p:txBody>
+          <a:bodyPr/>
+          <a:lstStyle/>
+          <a:p>
+            <a:fld id="{6C43C368-B4F5-3E41-AC60-B61C23CF3503}" type="slidenum">
+              <a:rPr lang="en-US" smtClean="0"/>
+              <a:pPr/>
+              <a:t>27</a:t>
+            </a:fld>
+            <a:endParaRPr lang="en-US" dirty="0"/>
+          </a:p>
+        </p:txBody>
+      </p:sp>
+      <p:sp>
+        <p:nvSpPr>
+          <p:cNvPr id="4" name="Title 3"/>
+          <p:cNvSpPr>
+            <a:spLocks noGrp="1"/>
+          </p:cNvSpPr>
+          <p:nvPr>
+            <p:ph type="title"/>
+          </p:nvPr>
+        </p:nvSpPr>
+        <p:spPr/>
+        <p:txBody>
+          <a:bodyPr/>
+          <a:lstStyle/>
+          <a:p>
+            <a:r>
+              <a:rPr lang="nb-NO" dirty="0" smtClean="0"/>
+              <a:t>Etter </a:t>
+            </a:r>
+            <a:r>
+              <a:rPr lang="nb-NO" dirty="0" err="1" smtClean="0"/>
+              <a:t>refaktorisering</a:t>
+            </a:r>
+            <a:r>
+              <a:rPr lang="nb-NO" dirty="0" smtClean="0"/>
+              <a:t> – </a:t>
+            </a:r>
+            <a:r>
+              <a:rPr lang="nb-NO" dirty="0" smtClean="0"/>
+              <a:t>DI (C#)</a:t>
+            </a:r>
+            <a:endParaRPr lang="nb-NO" dirty="0"/>
+          </a:p>
+        </p:txBody>
+      </p:sp>
+      <p:pic>
+        <p:nvPicPr>
+          <p:cNvPr id="7" name="Picture 6"/>
+          <p:cNvPicPr>
+            <a:picLocks noChangeAspect="1"/>
+          </p:cNvPicPr>
+          <p:nvPr/>
+        </p:nvPicPr>
+        <p:blipFill>
+          <a:blip r:embed="rId2">
+            <a:extLst>
+              <a:ext uri="{28A0092B-C50C-407E-A947-70E740481C1C}">
+                <a14:useLocalDpi xmlns:a14="http://schemas.microsoft.com/office/drawing/2010/main" val="0"/>
+              </a:ext>
+            </a:extLst>
+          </a:blip>
+          <a:stretch>
+            <a:fillRect/>
+          </a:stretch>
+        </p:blipFill>
+        <p:spPr>
+          <a:xfrm>
+            <a:off x="0" y="925497"/>
+            <a:ext cx="9144000" cy="5007006"/>
+          </a:xfrm>
+          <a:prstGeom prst="rect">
+            <a:avLst/>
+          </a:prstGeom>
+        </p:spPr>
+      </p:pic>
+    </p:spTree>
+    <p:extLst>
+      <p:ext uri="{BB962C8B-B14F-4D97-AF65-F5344CB8AC3E}">
+        <p14:creationId xmlns:p14="http://schemas.microsoft.com/office/powerpoint/2010/main" val="3498301242"/>
+      </p:ext>
+    </p:extLst>
+  </p:cSld>
+  <p:clrMapOvr>
+    <a:masterClrMapping/>
+  </p:clrMapOvr>
 </p:sld>
 </file>
 
@@ -14301,6 +14427,15 @@
 
 <file path=customXml/item1.xml><?xml version="1.0" encoding="utf-8"?>
 <?mso-contentType ?>
+<FormTemplates xmlns="http://schemas.microsoft.com/sharepoint/v3/contenttype/forms">
+  <Display>DocumentLibraryForm</Display>
+  <Edit>DocumentLibraryForm</Edit>
+  <New>DocumentLibraryForm</New>
+</FormTemplates>
+</file>
+
+<file path=customXml/item2.xml><?xml version="1.0" encoding="utf-8"?>
+<?mso-contentType ?>
 <spe:Receivers xmlns:spe="http://schemas.microsoft.com/sharepoint/events">
   <Receiver>
     <Name>Document ID Generator</Name>
@@ -14345,30 +14480,7 @@
 </spe:Receivers>
 </file>
 
-<file path=customXml/item2.xml><?xml version="1.0" encoding="utf-8"?>
-<?mso-contentType ?>
-<FormTemplates xmlns="http://schemas.microsoft.com/sharepoint/v3/contenttype/forms">
-  <Display>DocumentLibraryForm</Display>
-  <Edit>DocumentLibraryForm</Edit>
-  <New>DocumentLibraryForm</New>
-</FormTemplates>
-</file>
-
 <file path=customXml/item3.xml><?xml version="1.0" encoding="utf-8"?>
-<p:properties xmlns:p="http://schemas.microsoft.com/office/2006/metadata/properties" xmlns:xsi="http://www.w3.org/2001/XMLSchema-instance" xmlns:pc="http://schemas.microsoft.com/office/infopath/2007/PartnerControls">
-  <documentManagement>
-    <_dlc_DocId xmlns="cd7095a3-97f1-4663-a71f-a762e9d8a5de">FK7UAMZMK7QV-3061-47</_dlc_DocId>
-    <_dlc_DocIdUrl xmlns="cd7095a3-97f1-4663-a71f-a762e9d8a5de">
-      <Url>https://pingvinen.bouvet.no/stotte/dokumentmaler/_layouts/DocIdRedir.aspx?ID=FK7UAMZMK7QV-3061-47</Url>
-      <Description>FK7UAMZMK7QV-3061-47</Description>
-    </_dlc_DocIdUrl>
-    <PublishingExpirationDate xmlns="http://schemas.microsoft.com/sharepoint/v3" xsi:nil="true"/>
-    <PublishingStartDate xmlns="http://schemas.microsoft.com/sharepoint/v3" xsi:nil="true"/>
-  </documentManagement>
-</p:properties>
-</file>
-
-<file path=customXml/item4.xml><?xml version="1.0" encoding="utf-8"?>
 <ct:contentTypeSchema xmlns:ct="http://schemas.microsoft.com/office/2006/metadata/contentType" xmlns:ma="http://schemas.microsoft.com/office/2006/metadata/properties/metaAttributes" ct:_="" ma:_="" ma:contentTypeName="Document" ma:contentTypeID="0x0101006DE77A4C69F7B04F983EB828CF8C5433" ma:contentTypeVersion="2" ma:contentTypeDescription="Create a new document." ma:contentTypeScope="" ma:versionID="3f88a36eb5d68a1319bea6a26a0634f9">
   <xsd:schema xmlns:xsd="http://www.w3.org/2001/XMLSchema" xmlns:xs="http://www.w3.org/2001/XMLSchema" xmlns:p="http://schemas.microsoft.com/office/2006/metadata/properties" xmlns:ns1="http://schemas.microsoft.com/sharepoint/v3" xmlns:ns2="cd7095a3-97f1-4663-a71f-a762e9d8a5de" targetNamespace="http://schemas.microsoft.com/office/2006/metadata/properties" ma:root="true" ma:fieldsID="12e73613dd42fd77c3af4275080e49b8" ns1:_="" ns2:_="">
     <xsd:import namespace="http://schemas.microsoft.com/sharepoint/v3"/>
@@ -14530,7 +14642,29 @@
 </ct:contentTypeSchema>
 </file>
 
+<file path=customXml/item4.xml><?xml version="1.0" encoding="utf-8"?>
+<p:properties xmlns:p="http://schemas.microsoft.com/office/2006/metadata/properties" xmlns:xsi="http://www.w3.org/2001/XMLSchema-instance" xmlns:pc="http://schemas.microsoft.com/office/infopath/2007/PartnerControls">
+  <documentManagement>
+    <_dlc_DocId xmlns="cd7095a3-97f1-4663-a71f-a762e9d8a5de">FK7UAMZMK7QV-3061-47</_dlc_DocId>
+    <_dlc_DocIdUrl xmlns="cd7095a3-97f1-4663-a71f-a762e9d8a5de">
+      <Url>https://pingvinen.bouvet.no/stotte/dokumentmaler/_layouts/DocIdRedir.aspx?ID=FK7UAMZMK7QV-3061-47</Url>
+      <Description>FK7UAMZMK7QV-3061-47</Description>
+    </_dlc_DocIdUrl>
+    <PublishingExpirationDate xmlns="http://schemas.microsoft.com/sharepoint/v3" xsi:nil="true"/>
+    <PublishingStartDate xmlns="http://schemas.microsoft.com/sharepoint/v3" xsi:nil="true"/>
+  </documentManagement>
+</p:properties>
+</file>
+
 <file path=customXml/itemProps1.xml><?xml version="1.0" encoding="utf-8"?>
+<ds:datastoreItem xmlns:ds="http://schemas.openxmlformats.org/officeDocument/2006/customXml" ds:itemID="{2AEC2C5E-0142-4DE9-A3D1-E1C3DD77BB73}">
+  <ds:schemaRefs>
+    <ds:schemaRef ds:uri="http://schemas.microsoft.com/sharepoint/v3/contenttype/forms"/>
+  </ds:schemaRefs>
+</ds:datastoreItem>
+</file>
+
+<file path=customXml/itemProps2.xml><?xml version="1.0" encoding="utf-8"?>
 <ds:datastoreItem xmlns:ds="http://schemas.openxmlformats.org/officeDocument/2006/customXml" ds:itemID="{95047315-98B4-402D-A094-92B291EC55D5}">
   <ds:schemaRefs>
     <ds:schemaRef ds:uri="http://schemas.microsoft.com/sharepoint/events"/>
@@ -14538,32 +14672,7 @@
 </ds:datastoreItem>
 </file>
 
-<file path=customXml/itemProps2.xml><?xml version="1.0" encoding="utf-8"?>
-<ds:datastoreItem xmlns:ds="http://schemas.openxmlformats.org/officeDocument/2006/customXml" ds:itemID="{2AEC2C5E-0142-4DE9-A3D1-E1C3DD77BB73}">
-  <ds:schemaRefs>
-    <ds:schemaRef ds:uri="http://schemas.microsoft.com/sharepoint/v3/contenttype/forms"/>
-  </ds:schemaRefs>
-</ds:datastoreItem>
-</file>
-
 <file path=customXml/itemProps3.xml><?xml version="1.0" encoding="utf-8"?>
-<ds:datastoreItem xmlns:ds="http://schemas.openxmlformats.org/officeDocument/2006/customXml" ds:itemID="{82784505-B6AE-42FB-A8A3-841C6312BFF2}">
-  <ds:schemaRefs>
-    <ds:schemaRef ds:uri="http://schemas.microsoft.com/office/2006/documentManagement/types"/>
-    <ds:schemaRef ds:uri="http://schemas.microsoft.com/office/infopath/2007/PartnerControls"/>
-    <ds:schemaRef ds:uri="cd7095a3-97f1-4663-a71f-a762e9d8a5de"/>
-    <ds:schemaRef ds:uri="http://purl.org/dc/elements/1.1/"/>
-    <ds:schemaRef ds:uri="http://schemas.microsoft.com/office/2006/metadata/properties"/>
-    <ds:schemaRef ds:uri="http://schemas.microsoft.com/sharepoint/v3"/>
-    <ds:schemaRef ds:uri="http://purl.org/dc/terms/"/>
-    <ds:schemaRef ds:uri="http://schemas.openxmlformats.org/package/2006/metadata/core-properties"/>
-    <ds:schemaRef ds:uri="http://www.w3.org/XML/1998/namespace"/>
-    <ds:schemaRef ds:uri="http://purl.org/dc/dcmitype/"/>
-  </ds:schemaRefs>
-</ds:datastoreItem>
-</file>
-
-<file path=customXml/itemProps4.xml><?xml version="1.0" encoding="utf-8"?>
 <ds:datastoreItem xmlns:ds="http://schemas.openxmlformats.org/officeDocument/2006/customXml" ds:itemID="{85C41887-34B0-475C-96EF-12649FBB6FA4}">
   <ds:schemaRefs>
     <ds:schemaRef ds:uri="http://schemas.microsoft.com/office/2006/metadata/contentType"/>
@@ -14578,6 +14687,23 @@
     <ds:schemaRef ds:uri="http://purl.org/dc/elements/1.1/"/>
     <ds:schemaRef ds:uri="http://purl.org/dc/terms/"/>
     <ds:schemaRef ds:uri="http://schemas.microsoft.com/internal/obd"/>
+  </ds:schemaRefs>
+</ds:datastoreItem>
+</file>
+
+<file path=customXml/itemProps4.xml><?xml version="1.0" encoding="utf-8"?>
+<ds:datastoreItem xmlns:ds="http://schemas.openxmlformats.org/officeDocument/2006/customXml" ds:itemID="{82784505-B6AE-42FB-A8A3-841C6312BFF2}">
+  <ds:schemaRefs>
+    <ds:schemaRef ds:uri="http://schemas.microsoft.com/office/2006/documentManagement/types"/>
+    <ds:schemaRef ds:uri="http://schemas.microsoft.com/office/infopath/2007/PartnerControls"/>
+    <ds:schemaRef ds:uri="cd7095a3-97f1-4663-a71f-a762e9d8a5de"/>
+    <ds:schemaRef ds:uri="http://purl.org/dc/elements/1.1/"/>
+    <ds:schemaRef ds:uri="http://schemas.microsoft.com/office/2006/metadata/properties"/>
+    <ds:schemaRef ds:uri="http://schemas.microsoft.com/sharepoint/v3"/>
+    <ds:schemaRef ds:uri="http://purl.org/dc/terms/"/>
+    <ds:schemaRef ds:uri="http://schemas.openxmlformats.org/package/2006/metadata/core-properties"/>
+    <ds:schemaRef ds:uri="http://www.w3.org/XML/1998/namespace"/>
+    <ds:schemaRef ds:uri="http://purl.org/dc/dcmitype/"/>
   </ds:schemaRefs>
 </ds:datastoreItem>
 </file>

</xml_diff>

<commit_message>
Added some more slides.
</commit_message>
<xml_diff>
--- a/SOLID - SRP-DIP.pptx
+++ b/SOLID - SRP-DIP.pptx
@@ -5,10 +5,10 @@
     <p:sldMasterId id="2147483648" r:id="rId5"/>
   </p:sldMasterIdLst>
   <p:notesMasterIdLst>
-    <p:notesMasterId r:id="rId33"/>
+    <p:notesMasterId r:id="rId34"/>
   </p:notesMasterIdLst>
   <p:handoutMasterIdLst>
-    <p:handoutMasterId r:id="rId34"/>
+    <p:handoutMasterId r:id="rId35"/>
   </p:handoutMasterIdLst>
   <p:sldIdLst>
     <p:sldId id="256" r:id="rId6"/>
@@ -26,18 +26,19 @@
     <p:sldId id="316" r:id="rId18"/>
     <p:sldId id="305" r:id="rId19"/>
     <p:sldId id="306" r:id="rId20"/>
-    <p:sldId id="307" r:id="rId21"/>
-    <p:sldId id="308" r:id="rId22"/>
-    <p:sldId id="309" r:id="rId23"/>
-    <p:sldId id="310" r:id="rId24"/>
-    <p:sldId id="311" r:id="rId25"/>
-    <p:sldId id="325" r:id="rId26"/>
-    <p:sldId id="322" r:id="rId27"/>
-    <p:sldId id="326" r:id="rId28"/>
-    <p:sldId id="323" r:id="rId29"/>
-    <p:sldId id="327" r:id="rId30"/>
-    <p:sldId id="324" r:id="rId31"/>
-    <p:sldId id="328" r:id="rId32"/>
+    <p:sldId id="329" r:id="rId21"/>
+    <p:sldId id="307" r:id="rId22"/>
+    <p:sldId id="308" r:id="rId23"/>
+    <p:sldId id="309" r:id="rId24"/>
+    <p:sldId id="310" r:id="rId25"/>
+    <p:sldId id="311" r:id="rId26"/>
+    <p:sldId id="325" r:id="rId27"/>
+    <p:sldId id="322" r:id="rId28"/>
+    <p:sldId id="326" r:id="rId29"/>
+    <p:sldId id="323" r:id="rId30"/>
+    <p:sldId id="327" r:id="rId31"/>
+    <p:sldId id="324" r:id="rId32"/>
+    <p:sldId id="328" r:id="rId33"/>
   </p:sldIdLst>
   <p:sldSz cx="9144000" cy="6858000" type="screen4x3"/>
   <p:notesSz cx="6858000" cy="9144000"/>
@@ -282,7 +283,7 @@
             <a:fld id="{30BDBCCB-F02B-5948-960F-FA57E5A2C110}" type="datetimeFigureOut">
               <a:rPr lang="en-US" smtClean="0"/>
               <a:pPr/>
-              <a:t>3/25/2015</a:t>
+              <a:t>3/26/2015</a:t>
             </a:fld>
             <a:endParaRPr lang="en-US"/>
           </a:p>
@@ -450,7 +451,7 @@
             <a:fld id="{28EB9C19-8F4E-5D44-AF31-D0E24F8C4820}" type="datetimeFigureOut">
               <a:rPr lang="en-US" smtClean="0"/>
               <a:pPr/>
-              <a:t>3/25/2015</a:t>
+              <a:t>3/26/2015</a:t>
             </a:fld>
             <a:endParaRPr lang="en-US"/>
           </a:p>
@@ -1551,7 +1552,7 @@
           <a:p>
             <a:fld id="{846ABABA-9853-4204-932E-24BAD772A065}" type="slidenum">
               <a:rPr lang="nb-NO" smtClean="0"/>
-              <a:t>16</a:t>
+              <a:t>17</a:t>
             </a:fld>
             <a:endParaRPr lang="nb-NO"/>
           </a:p>
@@ -1655,7 +1656,7 @@
           <a:p>
             <a:fld id="{846ABABA-9853-4204-932E-24BAD772A065}" type="slidenum">
               <a:rPr lang="nb-NO" smtClean="0"/>
-              <a:t>17</a:t>
+              <a:t>18</a:t>
             </a:fld>
             <a:endParaRPr lang="nb-NO"/>
           </a:p>
@@ -1906,7 +1907,7 @@
           <a:p>
             <a:fld id="{846ABABA-9853-4204-932E-24BAD772A065}" type="slidenum">
               <a:rPr lang="nb-NO" smtClean="0"/>
-              <a:t>18</a:t>
+              <a:t>19</a:t>
             </a:fld>
             <a:endParaRPr lang="nb-NO"/>
           </a:p>
@@ -2020,7 +2021,7 @@
           <a:p>
             <a:fld id="{846ABABA-9853-4204-932E-24BAD772A065}" type="slidenum">
               <a:rPr lang="nb-NO" smtClean="0"/>
-              <a:t>19</a:t>
+              <a:t>20</a:t>
             </a:fld>
             <a:endParaRPr lang="nb-NO"/>
           </a:p>
@@ -2104,7 +2105,7 @@
           <a:p>
             <a:fld id="{846ABABA-9853-4204-932E-24BAD772A065}" type="slidenum">
               <a:rPr lang="nb-NO" smtClean="0"/>
-              <a:t>21</a:t>
+              <a:t>22</a:t>
             </a:fld>
             <a:endParaRPr lang="nb-NO"/>
           </a:p>
@@ -2189,7 +2190,7 @@
             <a:fld id="{9354269F-001C-C84B-8C2D-7B1B5A2DCE16}" type="slidenum">
               <a:rPr lang="en-US" smtClean="0"/>
               <a:pPr/>
-              <a:t>22</a:t>
+              <a:t>23</a:t>
             </a:fld>
             <a:endParaRPr lang="en-US"/>
           </a:p>
@@ -3854,7 +3855,7 @@
           <a:p>
             <a:fld id="{222D361C-D57E-4133-91D5-68918140FCBD}" type="datetimeFigureOut">
               <a:rPr lang="nb-NO" smtClean="0"/>
-              <a:t>25.03.2015</a:t>
+              <a:t>26.03.2015</a:t>
             </a:fld>
             <a:endParaRPr lang="nb-NO"/>
           </a:p>
@@ -8465,27 +8466,63 @@
             <p:ph type="title"/>
           </p:nvPr>
         </p:nvSpPr>
+        <p:spPr>
+          <a:xfrm>
+            <a:off x="467544" y="476250"/>
+            <a:ext cx="8193648" cy="1081088"/>
+          </a:xfrm>
+        </p:spPr>
+        <p:txBody>
+          <a:bodyPr/>
+          <a:lstStyle/>
+          <a:p>
+            <a:r>
+              <a:rPr lang="en-US" sz="3200" dirty="0" smtClean="0"/>
+              <a:t>Depend </a:t>
+            </a:r>
+            <a:r>
+              <a:rPr lang="en-US" sz="3200" dirty="0"/>
+              <a:t>on abstractions, not on </a:t>
+            </a:r>
+            <a:r>
+              <a:rPr lang="en-US" sz="3200" dirty="0" smtClean="0"/>
+              <a:t>concretions</a:t>
+            </a:r>
+            <a:endParaRPr lang="nb-NO" sz="3200" dirty="0"/>
+          </a:p>
+        </p:txBody>
+      </p:sp>
+      <p:sp>
+        <p:nvSpPr>
+          <p:cNvPr id="4" name="Date Placeholder 3"/>
+          <p:cNvSpPr>
+            <a:spLocks noGrp="1"/>
+          </p:cNvSpPr>
+          <p:nvPr>
+            <p:ph type="dt" sz="half" idx="10"/>
+          </p:nvPr>
+        </p:nvSpPr>
         <p:spPr/>
         <p:txBody>
           <a:bodyPr/>
           <a:lstStyle/>
           <a:p>
-            <a:r>
-              <a:rPr lang="nb-NO" sz="3200" dirty="0" smtClean="0"/>
-              <a:t>Ulike Strategier for å håndtere avhengigheter</a:t>
-            </a:r>
-            <a:endParaRPr lang="nb-NO" sz="3200" dirty="0"/>
-          </a:p>
-        </p:txBody>
-      </p:sp>
-      <p:sp>
-        <p:nvSpPr>
-          <p:cNvPr id="3" name="Content Placeholder 2"/>
+            <a:fld id="{4E3C4A76-8CFA-464B-8D23-3902310B72C2}" type="datetime1">
+              <a:rPr lang="nb-NO" smtClean="0"/>
+              <a:t>26.03.2015</a:t>
+            </a:fld>
+            <a:endParaRPr lang="nb-NO"/>
+          </a:p>
+        </p:txBody>
+      </p:sp>
+      <p:sp>
+        <p:nvSpPr>
+          <p:cNvPr id="5" name="Footer Placeholder 4"/>
           <p:cNvSpPr>
             <a:spLocks noGrp="1"/>
           </p:cNvSpPr>
           <p:nvPr>
-            <p:ph idx="1"/>
+            <p:ph type="ftr" sz="quarter" idx="11"/>
           </p:nvPr>
         </p:nvSpPr>
         <p:spPr/>
@@ -8493,48 +8530,119 @@
           <a:bodyPr/>
           <a:lstStyle/>
           <a:p>
-            <a:r>
-              <a:rPr lang="nb-NO" dirty="0" err="1" smtClean="0"/>
-              <a:t>Factory</a:t>
-            </a:r>
-            <a:r>
-              <a:rPr lang="nb-NO" dirty="0" smtClean="0"/>
-              <a:t> </a:t>
-            </a:r>
-            <a:r>
-              <a:rPr lang="nb-NO" dirty="0" err="1" smtClean="0"/>
-              <a:t>Pattern</a:t>
-            </a:r>
-            <a:endParaRPr lang="nb-NO" dirty="0" smtClean="0"/>
-          </a:p>
-          <a:p>
-            <a:r>
-              <a:rPr lang="nb-NO" dirty="0" smtClean="0"/>
-              <a:t>Service </a:t>
-            </a:r>
-            <a:r>
-              <a:rPr lang="nb-NO" dirty="0" err="1" smtClean="0"/>
-              <a:t>Locator</a:t>
-            </a:r>
-            <a:endParaRPr lang="nb-NO" dirty="0" smtClean="0"/>
-          </a:p>
-          <a:p>
-            <a:r>
-              <a:rPr lang="nb-NO" dirty="0" err="1" smtClean="0"/>
-              <a:t>IoC</a:t>
-            </a:r>
-            <a:r>
-              <a:rPr lang="nb-NO" dirty="0" smtClean="0"/>
-              <a:t> container</a:t>
-            </a:r>
-            <a:endParaRPr lang="nb-NO" dirty="0"/>
-          </a:p>
-        </p:txBody>
-      </p:sp>
+            <a:endParaRPr lang="nb-NO"/>
+          </a:p>
+        </p:txBody>
+      </p:sp>
+      <p:sp>
+        <p:nvSpPr>
+          <p:cNvPr id="6" name="Slide Number Placeholder 5"/>
+          <p:cNvSpPr>
+            <a:spLocks noGrp="1"/>
+          </p:cNvSpPr>
+          <p:nvPr>
+            <p:ph type="sldNum" sz="quarter" idx="12"/>
+          </p:nvPr>
+        </p:nvSpPr>
+        <p:spPr/>
+        <p:txBody>
+          <a:bodyPr/>
+          <a:lstStyle/>
+          <a:p>
+            <a:fld id="{0A3ECE36-80DC-4FE2-B2F6-5BAB45A7CC8A}" type="slidenum">
+              <a:rPr lang="nb-NO" smtClean="0"/>
+              <a:t>16</a:t>
+            </a:fld>
+            <a:endParaRPr lang="nb-NO"/>
+          </a:p>
+        </p:txBody>
+      </p:sp>
+      <p:pic>
+        <p:nvPicPr>
+          <p:cNvPr id="1028" name="Picture 4" descr="ebookreader-pdfbook"/>
+          <p:cNvPicPr>
+            <a:picLocks noChangeAspect="1" noChangeArrowheads="1"/>
+          </p:cNvPicPr>
+          <p:nvPr/>
+        </p:nvPicPr>
+        <p:blipFill>
+          <a:blip r:embed="rId2">
+            <a:extLst>
+              <a:ext uri="{28A0092B-C50C-407E-A947-70E740481C1C}">
+                <a14:useLocalDpi xmlns:a14="http://schemas.microsoft.com/office/drawing/2010/main" val="0"/>
+              </a:ext>
+            </a:extLst>
+          </a:blip>
+          <a:srcRect/>
+          <a:stretch>
+            <a:fillRect/>
+          </a:stretch>
+        </p:blipFill>
+        <p:spPr bwMode="auto">
+          <a:xfrm>
+            <a:off x="1033447" y="2024804"/>
+            <a:ext cx="7509155" cy="1113858"/>
+          </a:xfrm>
+          <a:prstGeom prst="rect">
+            <a:avLst/>
+          </a:prstGeom>
+          <a:noFill/>
+          <a:extLst>
+            <a:ext uri="{909E8E84-426E-40DD-AFC4-6F175D3DCCD1}">
+              <a14:hiddenFill xmlns:a14="http://schemas.microsoft.com/office/drawing/2010/main">
+                <a:solidFill>
+                  <a:srgbClr val="FFFFFF"/>
+                </a:solidFill>
+              </a14:hiddenFill>
+            </a:ext>
+          </a:extLst>
+        </p:spPr>
+      </p:pic>
+      <p:pic>
+        <p:nvPicPr>
+          <p:cNvPr id="1030" name="Picture 6" descr="ebookreader-ebookinterface-pdfbook"/>
+          <p:cNvPicPr>
+            <a:picLocks noChangeAspect="1" noChangeArrowheads="1"/>
+          </p:cNvPicPr>
+          <p:nvPr/>
+        </p:nvPicPr>
+        <p:blipFill>
+          <a:blip r:embed="rId3">
+            <a:extLst>
+              <a:ext uri="{28A0092B-C50C-407E-A947-70E740481C1C}">
+                <a14:useLocalDpi xmlns:a14="http://schemas.microsoft.com/office/drawing/2010/main" val="0"/>
+              </a:ext>
+            </a:extLst>
+          </a:blip>
+          <a:srcRect/>
+          <a:stretch>
+            <a:fillRect/>
+          </a:stretch>
+        </p:blipFill>
+        <p:spPr bwMode="auto">
+          <a:xfrm>
+            <a:off x="1033446" y="2132856"/>
+            <a:ext cx="7509155" cy="3078755"/>
+          </a:xfrm>
+          <a:prstGeom prst="rect">
+            <a:avLst/>
+          </a:prstGeom>
+          <a:noFill/>
+          <a:extLst>
+            <a:ext uri="{909E8E84-426E-40DD-AFC4-6F175D3DCCD1}">
+              <a14:hiddenFill xmlns:a14="http://schemas.microsoft.com/office/drawing/2010/main">
+                <a:solidFill>
+                  <a:srgbClr val="FFFFFF"/>
+                </a:solidFill>
+              </a14:hiddenFill>
+            </a:ext>
+          </a:extLst>
+        </p:spPr>
+      </p:pic>
     </p:spTree>
     <p:extLst>
       <p:ext uri="{BB962C8B-B14F-4D97-AF65-F5344CB8AC3E}">
-        <p14:creationId xmlns:p14="http://schemas.microsoft.com/office/powerpoint/2010/main" val="525747245"/>
+        <p14:creationId xmlns:p14="http://schemas.microsoft.com/office/powerpoint/2010/main" val="1117359805"/>
       </p:ext>
     </p:extLst>
   </p:cSld>
@@ -8544,7 +8652,83 @@
   <p:timing>
     <p:tnLst>
       <p:par>
-        <p:cTn id="1" dur="indefinite" restart="never" nodeType="tmRoot"/>
+        <p:cTn id="1" dur="indefinite" restart="never" nodeType="tmRoot">
+          <p:childTnLst>
+            <p:seq concurrent="1" nextAc="seek">
+              <p:cTn id="2" dur="indefinite" nodeType="mainSeq">
+                <p:childTnLst>
+                  <p:par>
+                    <p:cTn id="3" fill="hold">
+                      <p:stCondLst>
+                        <p:cond delay="indefinite"/>
+                      </p:stCondLst>
+                      <p:childTnLst>
+                        <p:par>
+                          <p:cTn id="4" fill="hold">
+                            <p:stCondLst>
+                              <p:cond delay="0"/>
+                            </p:stCondLst>
+                            <p:childTnLst>
+                              <p:par>
+                                <p:cTn id="5" presetID="10" presetClass="entr" presetSubtype="0" fill="hold" nodeType="clickEffect">
+                                  <p:stCondLst>
+                                    <p:cond delay="0"/>
+                                  </p:stCondLst>
+                                  <p:childTnLst>
+                                    <p:set>
+                                      <p:cBhvr>
+                                        <p:cTn id="6" dur="1" fill="hold">
+                                          <p:stCondLst>
+                                            <p:cond delay="0"/>
+                                          </p:stCondLst>
+                                        </p:cTn>
+                                        <p:tgtEl>
+                                          <p:spTgt spid="1030"/>
+                                        </p:tgtEl>
+                                        <p:attrNameLst>
+                                          <p:attrName>style.visibility</p:attrName>
+                                        </p:attrNameLst>
+                                      </p:cBhvr>
+                                      <p:to>
+                                        <p:strVal val="visible"/>
+                                      </p:to>
+                                    </p:set>
+                                    <p:animEffect transition="in" filter="fade">
+                                      <p:cBhvr>
+                                        <p:cTn id="7" dur="500"/>
+                                        <p:tgtEl>
+                                          <p:spTgt spid="1030"/>
+                                        </p:tgtEl>
+                                      </p:cBhvr>
+                                    </p:animEffect>
+                                  </p:childTnLst>
+                                </p:cTn>
+                              </p:par>
+                            </p:childTnLst>
+                          </p:cTn>
+                        </p:par>
+                      </p:childTnLst>
+                    </p:cTn>
+                  </p:par>
+                </p:childTnLst>
+              </p:cTn>
+              <p:prevCondLst>
+                <p:cond evt="onPrev" delay="0">
+                  <p:tgtEl>
+                    <p:sldTgt/>
+                  </p:tgtEl>
+                </p:cond>
+              </p:prevCondLst>
+              <p:nextCondLst>
+                <p:cond evt="onNext" delay="0">
+                  <p:tgtEl>
+                    <p:sldTgt/>
+                  </p:tgtEl>
+                </p:cond>
+              </p:nextCondLst>
+            </p:seq>
+          </p:childTnLst>
+        </p:cTn>
       </p:par>
     </p:tnLst>
   </p:timing>
@@ -8584,47 +8768,61 @@
           <a:lstStyle/>
           <a:p>
             <a:r>
+              <a:rPr lang="nb-NO" sz="3200" dirty="0" smtClean="0"/>
+              <a:t>Ulike Strategier for å håndtere avhengigheter</a:t>
+            </a:r>
+            <a:endParaRPr lang="nb-NO" sz="3200" dirty="0"/>
+          </a:p>
+        </p:txBody>
+      </p:sp>
+      <p:sp>
+        <p:nvSpPr>
+          <p:cNvPr id="3" name="Content Placeholder 2"/>
+          <p:cNvSpPr>
+            <a:spLocks noGrp="1"/>
+          </p:cNvSpPr>
+          <p:nvPr>
+            <p:ph idx="1"/>
+          </p:nvPr>
+        </p:nvSpPr>
+        <p:spPr/>
+        <p:txBody>
+          <a:bodyPr/>
+          <a:lstStyle/>
+          <a:p>
+            <a:r>
+              <a:rPr lang="nb-NO" dirty="0" err="1" smtClean="0"/>
+              <a:t>Factory</a:t>
+            </a:r>
+            <a:r>
               <a:rPr lang="nb-NO" dirty="0" smtClean="0"/>
-              <a:t>Hva er fordelene?</a:t>
-            </a:r>
-            <a:endParaRPr lang="nb-NO" dirty="0"/>
-          </a:p>
-        </p:txBody>
-      </p:sp>
-      <p:sp>
-        <p:nvSpPr>
-          <p:cNvPr id="3" name="Content Placeholder 2"/>
-          <p:cNvSpPr>
-            <a:spLocks noGrp="1"/>
-          </p:cNvSpPr>
-          <p:nvPr>
-            <p:ph idx="1"/>
-          </p:nvPr>
-        </p:nvSpPr>
-        <p:spPr/>
-        <p:txBody>
-          <a:bodyPr/>
-          <a:lstStyle/>
+              <a:t> </a:t>
+            </a:r>
+            <a:r>
+              <a:rPr lang="nb-NO" dirty="0" err="1" smtClean="0"/>
+              <a:t>Pattern</a:t>
+            </a:r>
+            <a:endParaRPr lang="nb-NO" dirty="0" smtClean="0"/>
+          </a:p>
           <a:p>
             <a:r>
               <a:rPr lang="nb-NO" dirty="0" smtClean="0"/>
-              <a:t>Fleksibelt – kan enkelt bytte ut funksjonalitet</a:t>
-            </a:r>
-          </a:p>
-          <a:p>
+              <a:t>Service </a:t>
+            </a:r>
+            <a:r>
+              <a:rPr lang="nb-NO" dirty="0" err="1" smtClean="0"/>
+              <a:t>Locator</a:t>
+            </a:r>
+            <a:endParaRPr lang="nb-NO" dirty="0" smtClean="0"/>
+          </a:p>
+          <a:p>
+            <a:r>
+              <a:rPr lang="nb-NO" dirty="0" err="1" smtClean="0"/>
+              <a:t>IoC</a:t>
+            </a:r>
             <a:r>
               <a:rPr lang="nb-NO" dirty="0" smtClean="0"/>
-              <a:t>Kontroll på sammensetning av systemet</a:t>
-            </a:r>
-          </a:p>
-          <a:p>
-            <a:r>
-              <a:rPr lang="nb-NO" dirty="0"/>
-              <a:t>Avhengigheter blir </a:t>
-            </a:r>
-            <a:r>
-              <a:rPr lang="nb-NO" dirty="0" smtClean="0"/>
-              <a:t>tydeligere</a:t>
+              <a:t> container</a:t>
             </a:r>
             <a:endParaRPr lang="nb-NO" dirty="0"/>
           </a:p>
@@ -8633,7 +8831,7 @@
     </p:spTree>
     <p:extLst>
       <p:ext uri="{BB962C8B-B14F-4D97-AF65-F5344CB8AC3E}">
-        <p14:creationId xmlns:p14="http://schemas.microsoft.com/office/powerpoint/2010/main" val="3076038005"/>
+        <p14:creationId xmlns:p14="http://schemas.microsoft.com/office/powerpoint/2010/main" val="525747245"/>
       </p:ext>
     </p:extLst>
   </p:cSld>
@@ -8677,20 +8875,59 @@
             <p:ph type="title"/>
           </p:nvPr>
         </p:nvSpPr>
-        <p:spPr>
-          <a:xfrm>
-            <a:off x="468314" y="1196541"/>
-            <a:ext cx="8207375" cy="4464918"/>
-          </a:xfrm>
-        </p:spPr>
+        <p:spPr/>
         <p:txBody>
           <a:bodyPr/>
           <a:lstStyle/>
           <a:p>
-            <a:pPr algn="ctr"/>
             <a:r>
               <a:rPr lang="nb-NO" dirty="0" smtClean="0"/>
-              <a:t>Eksempel</a:t>
+              <a:t>Hva er fordelene?</a:t>
+            </a:r>
+            <a:endParaRPr lang="nb-NO" dirty="0"/>
+          </a:p>
+        </p:txBody>
+      </p:sp>
+      <p:sp>
+        <p:nvSpPr>
+          <p:cNvPr id="3" name="Content Placeholder 2"/>
+          <p:cNvSpPr>
+            <a:spLocks noGrp="1"/>
+          </p:cNvSpPr>
+          <p:nvPr>
+            <p:ph idx="1"/>
+          </p:nvPr>
+        </p:nvSpPr>
+        <p:spPr/>
+        <p:txBody>
+          <a:bodyPr/>
+          <a:lstStyle/>
+          <a:p>
+            <a:r>
+              <a:rPr lang="nb-NO" dirty="0" smtClean="0"/>
+              <a:t>Fleksibelt – kan enkelt bytte ut funksjonalitet</a:t>
+            </a:r>
+          </a:p>
+          <a:p>
+            <a:r>
+              <a:rPr lang="nb-NO" dirty="0" smtClean="0"/>
+              <a:t>Kontroll på sammensetning av systemet</a:t>
+            </a:r>
+          </a:p>
+          <a:p>
+            <a:r>
+              <a:rPr lang="nb-NO" dirty="0"/>
+              <a:t>Avhengigheter blir </a:t>
+            </a:r>
+            <a:r>
+              <a:rPr lang="nb-NO" dirty="0" smtClean="0"/>
+              <a:t>tydeligere</a:t>
+            </a:r>
+          </a:p>
+          <a:p>
+            <a:r>
+              <a:rPr lang="nb-NO" dirty="0" smtClean="0"/>
+              <a:t>Høy testbarhet</a:t>
             </a:r>
             <a:endParaRPr lang="nb-NO" dirty="0"/>
           </a:p>
@@ -8699,7 +8936,7 @@
     </p:spTree>
     <p:extLst>
       <p:ext uri="{BB962C8B-B14F-4D97-AF65-F5344CB8AC3E}">
-        <p14:creationId xmlns:p14="http://schemas.microsoft.com/office/powerpoint/2010/main" val="2002806170"/>
+        <p14:creationId xmlns:p14="http://schemas.microsoft.com/office/powerpoint/2010/main" val="3076038005"/>
       </p:ext>
     </p:extLst>
   </p:cSld>
@@ -8743,160 +8980,29 @@
             <p:ph type="title"/>
           </p:nvPr>
         </p:nvSpPr>
-        <p:spPr/>
+        <p:spPr>
+          <a:xfrm>
+            <a:off x="468314" y="1196541"/>
+            <a:ext cx="8207375" cy="4464918"/>
+          </a:xfrm>
+        </p:spPr>
         <p:txBody>
           <a:bodyPr/>
           <a:lstStyle/>
           <a:p>
+            <a:pPr algn="ctr"/>
             <a:r>
               <a:rPr lang="nb-NO" dirty="0" smtClean="0"/>
-              <a:t>Til ettertanke…</a:t>
+              <a:t>Eksempel</a:t>
             </a:r>
             <a:endParaRPr lang="nb-NO" dirty="0"/>
-          </a:p>
-        </p:txBody>
-      </p:sp>
-      <p:sp>
-        <p:nvSpPr>
-          <p:cNvPr id="3" name="Content Placeholder 2"/>
-          <p:cNvSpPr>
-            <a:spLocks noGrp="1"/>
-          </p:cNvSpPr>
-          <p:nvPr>
-            <p:ph idx="1"/>
-          </p:nvPr>
-        </p:nvSpPr>
-        <p:spPr/>
-        <p:txBody>
-          <a:bodyPr/>
-          <a:lstStyle/>
-          <a:p>
-            <a:r>
-              <a:rPr lang="nb-NO" dirty="0" smtClean="0"/>
-              <a:t>Finn en balanse mellom SOLID og KISS (</a:t>
-            </a:r>
-            <a:r>
-              <a:rPr lang="nb-NO" dirty="0" err="1" smtClean="0"/>
-              <a:t>don’t</a:t>
-            </a:r>
-            <a:r>
-              <a:rPr lang="nb-NO" dirty="0" smtClean="0"/>
-              <a:t> over-</a:t>
-            </a:r>
-            <a:r>
-              <a:rPr lang="nb-NO" dirty="0" err="1" smtClean="0"/>
-              <a:t>engineer</a:t>
-            </a:r>
-            <a:r>
-              <a:rPr lang="nb-NO" dirty="0" smtClean="0"/>
-              <a:t>)</a:t>
-            </a:r>
-          </a:p>
-          <a:p>
-            <a:r>
-              <a:rPr lang="nb-NO" dirty="0" smtClean="0"/>
-              <a:t>Tenk lesbarhet</a:t>
-            </a:r>
-          </a:p>
-          <a:p>
-            <a:r>
-              <a:rPr lang="nb-NO" dirty="0" smtClean="0"/>
-              <a:t>Det blir mer kode</a:t>
-            </a:r>
-          </a:p>
-          <a:p>
-            <a:r>
-              <a:rPr lang="nb-NO" dirty="0" smtClean="0"/>
-              <a:t>Finn et kompromiss, bestem «hvor langt ned» du vil gjøre koden SOLID (hvor kan kravene endre seg?)</a:t>
-            </a:r>
-          </a:p>
-          <a:p>
-            <a:r>
-              <a:rPr lang="nb-NO" dirty="0" smtClean="0">
-                <a:hlinkClick r:id="rId3"/>
-              </a:rPr>
-              <a:t>The </a:t>
-            </a:r>
-            <a:r>
-              <a:rPr lang="nb-NO" dirty="0" err="1" smtClean="0">
-                <a:hlinkClick r:id="rId3"/>
-              </a:rPr>
-              <a:t>abuse</a:t>
-            </a:r>
-            <a:r>
-              <a:rPr lang="nb-NO" dirty="0" smtClean="0">
-                <a:hlinkClick r:id="rId3"/>
-              </a:rPr>
-              <a:t> </a:t>
-            </a:r>
-            <a:r>
-              <a:rPr lang="nb-NO" dirty="0" err="1" smtClean="0">
-                <a:hlinkClick r:id="rId3"/>
-              </a:rPr>
-              <a:t>of</a:t>
-            </a:r>
-            <a:r>
-              <a:rPr lang="nb-NO" dirty="0" smtClean="0">
-                <a:hlinkClick r:id="rId3"/>
-              </a:rPr>
-              <a:t> design </a:t>
-            </a:r>
-            <a:r>
-              <a:rPr lang="nb-NO" dirty="0" err="1" smtClean="0">
-                <a:hlinkClick r:id="rId3"/>
-              </a:rPr>
-              <a:t>patterns</a:t>
-            </a:r>
-            <a:r>
-              <a:rPr lang="nb-NO" dirty="0" smtClean="0">
-                <a:hlinkClick r:id="rId3"/>
-              </a:rPr>
-              <a:t> in </a:t>
-            </a:r>
-            <a:r>
-              <a:rPr lang="nb-NO" dirty="0" err="1" smtClean="0">
-                <a:hlinkClick r:id="rId3"/>
-              </a:rPr>
-              <a:t>writing</a:t>
-            </a:r>
-            <a:r>
-              <a:rPr lang="nb-NO" dirty="0" smtClean="0">
-                <a:hlinkClick r:id="rId3"/>
-              </a:rPr>
-              <a:t> a </a:t>
-            </a:r>
-            <a:r>
-              <a:rPr lang="nb-NO" dirty="0" err="1" smtClean="0">
-                <a:hlinkClick r:id="rId3"/>
-              </a:rPr>
-              <a:t>hello</a:t>
-            </a:r>
-            <a:r>
-              <a:rPr lang="nb-NO" dirty="0" smtClean="0">
-                <a:hlinkClick r:id="rId3"/>
-              </a:rPr>
-              <a:t> </a:t>
-            </a:r>
-            <a:r>
-              <a:rPr lang="nb-NO" dirty="0" err="1" smtClean="0">
-                <a:hlinkClick r:id="rId3"/>
-              </a:rPr>
-              <a:t>world</a:t>
-            </a:r>
-            <a:r>
-              <a:rPr lang="nb-NO" dirty="0" smtClean="0">
-                <a:hlinkClick r:id="rId3"/>
-              </a:rPr>
-              <a:t> program</a:t>
-            </a:r>
-            <a:endParaRPr lang="nb-NO" dirty="0" smtClean="0"/>
           </a:p>
         </p:txBody>
       </p:sp>
     </p:spTree>
     <p:extLst>
       <p:ext uri="{BB962C8B-B14F-4D97-AF65-F5344CB8AC3E}">
-        <p14:creationId xmlns:p14="http://schemas.microsoft.com/office/powerpoint/2010/main" val="1887413613"/>
+        <p14:creationId xmlns:p14="http://schemas.microsoft.com/office/powerpoint/2010/main" val="2002806170"/>
       </p:ext>
     </p:extLst>
   </p:cSld>
@@ -8998,7 +9104,7 @@
       </p:grpSpPr>
       <p:sp>
         <p:nvSpPr>
-          <p:cNvPr id="5" name="Title 4"/>
+          <p:cNvPr id="2" name="Title 1"/>
           <p:cNvSpPr>
             <a:spLocks noGrp="1"/>
           </p:cNvSpPr>
@@ -9006,55 +9112,160 @@
             <p:ph type="title"/>
           </p:nvPr>
         </p:nvSpPr>
-        <p:spPr>
-          <a:xfrm>
-            <a:off x="971600" y="1196541"/>
-            <a:ext cx="7200800" cy="4464918"/>
-          </a:xfrm>
-        </p:spPr>
-        <p:txBody>
-          <a:bodyPr>
-            <a:normAutofit/>
-          </a:bodyPr>
-          <a:lstStyle/>
-          <a:p>
-            <a:r>
-              <a:rPr lang="nb-NO" sz="3200" dirty="0"/>
-              <a:t>Ha SOLID i bakhodet.</a:t>
-            </a:r>
-            <a:br>
-              <a:rPr lang="nb-NO" sz="3200" dirty="0"/>
-            </a:br>
-            <a:r>
-              <a:rPr lang="nb-NO" sz="3200" dirty="0"/>
-              <a:t/>
-            </a:r>
-            <a:br>
-              <a:rPr lang="nb-NO" sz="3200" dirty="0"/>
-            </a:br>
-            <a:r>
-              <a:rPr lang="nb-NO" sz="3200" dirty="0"/>
-              <a:t>Det vil hjelpe deg å se «</a:t>
-            </a:r>
-            <a:r>
-              <a:rPr lang="nb-NO" sz="3200" dirty="0" err="1"/>
-              <a:t>code</a:t>
-            </a:r>
-            <a:r>
-              <a:rPr lang="nb-NO" sz="3200" dirty="0"/>
-              <a:t> smells», og vil gi deg en pekepinn på hva du bør gjøre for å fikse opp i problemene.</a:t>
-            </a:r>
-            <a:br>
-              <a:rPr lang="nb-NO" sz="3200" dirty="0"/>
-            </a:br>
-            <a:endParaRPr lang="nb-NO" sz="3200" dirty="0"/>
+        <p:spPr/>
+        <p:txBody>
+          <a:bodyPr/>
+          <a:lstStyle/>
+          <a:p>
+            <a:r>
+              <a:rPr lang="nb-NO" dirty="0" smtClean="0"/>
+              <a:t>Til ettertanke…</a:t>
+            </a:r>
+            <a:endParaRPr lang="nb-NO" dirty="0"/>
+          </a:p>
+        </p:txBody>
+      </p:sp>
+      <p:sp>
+        <p:nvSpPr>
+          <p:cNvPr id="3" name="Content Placeholder 2"/>
+          <p:cNvSpPr>
+            <a:spLocks noGrp="1"/>
+          </p:cNvSpPr>
+          <p:nvPr>
+            <p:ph idx="1"/>
+          </p:nvPr>
+        </p:nvSpPr>
+        <p:spPr/>
+        <p:txBody>
+          <a:bodyPr/>
+          <a:lstStyle/>
+          <a:p>
+            <a:r>
+              <a:rPr lang="nb-NO" dirty="0" smtClean="0"/>
+              <a:t>Finn en balanse mellom SOLID og KISS (</a:t>
+            </a:r>
+            <a:r>
+              <a:rPr lang="nb-NO" dirty="0" err="1" smtClean="0"/>
+              <a:t>don’t</a:t>
+            </a:r>
+            <a:r>
+              <a:rPr lang="nb-NO" dirty="0" smtClean="0"/>
+              <a:t> over-</a:t>
+            </a:r>
+            <a:r>
+              <a:rPr lang="nb-NO" dirty="0" err="1" smtClean="0"/>
+              <a:t>engineer</a:t>
+            </a:r>
+            <a:r>
+              <a:rPr lang="nb-NO" dirty="0" smtClean="0"/>
+              <a:t>)</a:t>
+            </a:r>
+          </a:p>
+          <a:p>
+            <a:r>
+              <a:rPr lang="nb-NO" dirty="0" smtClean="0"/>
+              <a:t>Tenk lesbarhet</a:t>
+            </a:r>
+          </a:p>
+          <a:p>
+            <a:r>
+              <a:rPr lang="nb-NO" dirty="0" smtClean="0"/>
+              <a:t>Det blir mer kode</a:t>
+            </a:r>
+          </a:p>
+          <a:p>
+            <a:r>
+              <a:rPr lang="nb-NO" dirty="0" smtClean="0"/>
+              <a:t>Finn et kompromiss, bestem «hvor langt ned» du vil gjøre koden SOLID (hvor kan kravene endre seg?)</a:t>
+            </a:r>
+          </a:p>
+          <a:p>
+            <a:r>
+              <a:rPr lang="nb-NO" dirty="0" smtClean="0">
+                <a:hlinkClick r:id="rId3"/>
+              </a:rPr>
+              <a:t>The </a:t>
+            </a:r>
+            <a:r>
+              <a:rPr lang="nb-NO" dirty="0" err="1" smtClean="0">
+                <a:hlinkClick r:id="rId3"/>
+              </a:rPr>
+              <a:t>abuse</a:t>
+            </a:r>
+            <a:r>
+              <a:rPr lang="nb-NO" dirty="0" smtClean="0">
+                <a:hlinkClick r:id="rId3"/>
+              </a:rPr>
+              <a:t> </a:t>
+            </a:r>
+            <a:r>
+              <a:rPr lang="nb-NO" dirty="0" err="1" smtClean="0">
+                <a:hlinkClick r:id="rId3"/>
+              </a:rPr>
+              <a:t>of</a:t>
+            </a:r>
+            <a:r>
+              <a:rPr lang="nb-NO" dirty="0" smtClean="0">
+                <a:hlinkClick r:id="rId3"/>
+              </a:rPr>
+              <a:t> design </a:t>
+            </a:r>
+            <a:r>
+              <a:rPr lang="nb-NO" dirty="0" err="1" smtClean="0">
+                <a:hlinkClick r:id="rId3"/>
+              </a:rPr>
+              <a:t>patterns</a:t>
+            </a:r>
+            <a:r>
+              <a:rPr lang="nb-NO" dirty="0" smtClean="0">
+                <a:hlinkClick r:id="rId3"/>
+              </a:rPr>
+              <a:t> in </a:t>
+            </a:r>
+            <a:r>
+              <a:rPr lang="nb-NO" dirty="0" err="1" smtClean="0">
+                <a:hlinkClick r:id="rId3"/>
+              </a:rPr>
+              <a:t>writing</a:t>
+            </a:r>
+            <a:r>
+              <a:rPr lang="nb-NO" dirty="0" smtClean="0">
+                <a:hlinkClick r:id="rId3"/>
+              </a:rPr>
+              <a:t> a </a:t>
+            </a:r>
+            <a:r>
+              <a:rPr lang="nb-NO" dirty="0" err="1" smtClean="0">
+                <a:hlinkClick r:id="rId3"/>
+              </a:rPr>
+              <a:t>hello</a:t>
+            </a:r>
+            <a:r>
+              <a:rPr lang="nb-NO" dirty="0" smtClean="0">
+                <a:hlinkClick r:id="rId3"/>
+              </a:rPr>
+              <a:t> </a:t>
+            </a:r>
+            <a:r>
+              <a:rPr lang="nb-NO" dirty="0" err="1" smtClean="0">
+                <a:hlinkClick r:id="rId3"/>
+              </a:rPr>
+              <a:t>world</a:t>
+            </a:r>
+            <a:r>
+              <a:rPr lang="nb-NO" dirty="0" smtClean="0">
+                <a:hlinkClick r:id="rId3"/>
+              </a:rPr>
+              <a:t> program</a:t>
+            </a:r>
+            <a:endParaRPr lang="nb-NO" dirty="0" smtClean="0"/>
           </a:p>
         </p:txBody>
       </p:sp>
     </p:spTree>
     <p:extLst>
       <p:ext uri="{BB962C8B-B14F-4D97-AF65-F5344CB8AC3E}">
-        <p14:creationId xmlns:p14="http://schemas.microsoft.com/office/powerpoint/2010/main" val="1816400402"/>
+        <p14:creationId xmlns:p14="http://schemas.microsoft.com/office/powerpoint/2010/main" val="1887413613"/>
       </p:ext>
     </p:extLst>
   </p:cSld>
@@ -9090,6 +9301,98 @@
       </p:grpSpPr>
       <p:sp>
         <p:nvSpPr>
+          <p:cNvPr id="5" name="Title 4"/>
+          <p:cNvSpPr>
+            <a:spLocks noGrp="1"/>
+          </p:cNvSpPr>
+          <p:nvPr>
+            <p:ph type="title"/>
+          </p:nvPr>
+        </p:nvSpPr>
+        <p:spPr>
+          <a:xfrm>
+            <a:off x="971600" y="1196541"/>
+            <a:ext cx="7200800" cy="4464918"/>
+          </a:xfrm>
+        </p:spPr>
+        <p:txBody>
+          <a:bodyPr>
+            <a:normAutofit/>
+          </a:bodyPr>
+          <a:lstStyle/>
+          <a:p>
+            <a:r>
+              <a:rPr lang="nb-NO" sz="3200" dirty="0"/>
+              <a:t>Ha SOLID i bakhodet.</a:t>
+            </a:r>
+            <a:br>
+              <a:rPr lang="nb-NO" sz="3200" dirty="0"/>
+            </a:br>
+            <a:r>
+              <a:rPr lang="nb-NO" sz="3200" dirty="0"/>
+              <a:t/>
+            </a:r>
+            <a:br>
+              <a:rPr lang="nb-NO" sz="3200" dirty="0"/>
+            </a:br>
+            <a:r>
+              <a:rPr lang="nb-NO" sz="3200" dirty="0"/>
+              <a:t>Det vil hjelpe deg å se «</a:t>
+            </a:r>
+            <a:r>
+              <a:rPr lang="nb-NO" sz="3200" dirty="0" err="1"/>
+              <a:t>code</a:t>
+            </a:r>
+            <a:r>
+              <a:rPr lang="nb-NO" sz="3200" dirty="0"/>
+              <a:t> smells», og vil gi deg en pekepinn på hva du bør gjøre for å fikse opp i problemene.</a:t>
+            </a:r>
+            <a:br>
+              <a:rPr lang="nb-NO" sz="3200" dirty="0"/>
+            </a:br>
+            <a:endParaRPr lang="nb-NO" sz="3200" dirty="0"/>
+          </a:p>
+        </p:txBody>
+      </p:sp>
+    </p:spTree>
+    <p:extLst>
+      <p:ext uri="{BB962C8B-B14F-4D97-AF65-F5344CB8AC3E}">
+        <p14:creationId xmlns:p14="http://schemas.microsoft.com/office/powerpoint/2010/main" val="1816400402"/>
+      </p:ext>
+    </p:extLst>
+  </p:cSld>
+  <p:clrMapOvr>
+    <a:masterClrMapping/>
+  </p:clrMapOvr>
+  <p:timing>
+    <p:tnLst>
+      <p:par>
+        <p:cTn id="1" dur="indefinite" restart="never" nodeType="tmRoot"/>
+      </p:par>
+    </p:tnLst>
+  </p:timing>
+</p:sld>
+</file>
+
+<file path=ppt/slides/slide22.xml><?xml version="1.0" encoding="utf-8"?>
+<p:sld xmlns:a="http://schemas.openxmlformats.org/drawingml/2006/main" xmlns:r="http://schemas.openxmlformats.org/officeDocument/2006/relationships" xmlns:p="http://schemas.openxmlformats.org/presentationml/2006/main">
+  <p:cSld>
+    <p:spTree>
+      <p:nvGrpSpPr>
+        <p:cNvPr id="1" name=""/>
+        <p:cNvGrpSpPr/>
+        <p:nvPr/>
+      </p:nvGrpSpPr>
+      <p:grpSpPr>
+        <a:xfrm>
+          <a:off x="0" y="0"/>
+          <a:ext cx="0" cy="0"/>
+          <a:chOff x="0" y="0"/>
+          <a:chExt cx="0" cy="0"/>
+        </a:xfrm>
+      </p:grpSpPr>
+      <p:sp>
+        <p:nvSpPr>
           <p:cNvPr id="4" name="Rectangle 3"/>
           <p:cNvSpPr/>
           <p:nvPr/>
@@ -10297,12 +10600,12 @@
               <a:t>Flere SOLID workshops </a:t>
             </a:r>
             <a:r>
-              <a:rPr lang="nb-NO" dirty="0" smtClean="0">
+              <a:rPr lang="nb-NO" i="0" dirty="0" smtClean="0">
                 <a:sym typeface="Wingdings" panose="05000000000000000000" pitchFamily="2" charset="2"/>
               </a:rPr>
               <a:t></a:t>
             </a:r>
-            <a:endParaRPr lang="nb-NO" dirty="0"/>
+            <a:endParaRPr lang="nb-NO" i="0" dirty="0"/>
           </a:p>
         </p:txBody>
       </p:sp>
@@ -10759,208 +11062,6 @@
 </p:sld>
 </file>
 
-<file path=ppt/slides/slide22.xml><?xml version="1.0" encoding="utf-8"?>
-<p:sld xmlns:a="http://schemas.openxmlformats.org/drawingml/2006/main" xmlns:r="http://schemas.openxmlformats.org/officeDocument/2006/relationships" xmlns:p="http://schemas.openxmlformats.org/presentationml/2006/main">
-  <p:cSld>
-    <p:spTree>
-      <p:nvGrpSpPr>
-        <p:cNvPr id="1" name=""/>
-        <p:cNvGrpSpPr/>
-        <p:nvPr/>
-      </p:nvGrpSpPr>
-      <p:grpSpPr>
-        <a:xfrm>
-          <a:off x="0" y="0"/>
-          <a:ext cx="0" cy="0"/>
-          <a:chOff x="0" y="0"/>
-          <a:chExt cx="0" cy="0"/>
-        </a:xfrm>
-      </p:grpSpPr>
-      <p:sp>
-        <p:nvSpPr>
-          <p:cNvPr id="2" name="Plassholder for innhold 1"/>
-          <p:cNvSpPr>
-            <a:spLocks noGrp="1"/>
-          </p:cNvSpPr>
-          <p:nvPr>
-            <p:ph idx="1"/>
-          </p:nvPr>
-        </p:nvSpPr>
-        <p:spPr>
-          <a:xfrm>
-            <a:off x="467545" y="1340769"/>
-            <a:ext cx="8201055" cy="4896522"/>
-          </a:xfrm>
-        </p:spPr>
-        <p:txBody>
-          <a:bodyPr>
-            <a:normAutofit/>
-          </a:bodyPr>
-          <a:lstStyle/>
-          <a:p>
-            <a:pPr marL="0" indent="0">
-              <a:buNone/>
-            </a:pPr>
-            <a:r>
-              <a:rPr lang="nb-NO" dirty="0"/>
-              <a:t>Last ned kildekoden:</a:t>
-            </a:r>
-          </a:p>
-          <a:p>
-            <a:pPr marL="0" indent="0">
-              <a:buNone/>
-            </a:pPr>
-            <a:r>
-              <a:rPr lang="nb-NO" sz="2000" b="1" dirty="0" smtClean="0">
-                <a:latin typeface="Courier New" panose="02070309020205020404" pitchFamily="49" charset="0"/>
-                <a:cs typeface="Courier New" panose="02070309020205020404" pitchFamily="49" charset="0"/>
-              </a:rPr>
-              <a:t>	</a:t>
-            </a:r>
-            <a:r>
-              <a:rPr lang="nb-NO" sz="2000" b="1" dirty="0" err="1" smtClean="0">
-                <a:latin typeface="Courier New" panose="02070309020205020404" pitchFamily="49" charset="0"/>
-                <a:cs typeface="Courier New" panose="02070309020205020404" pitchFamily="49" charset="0"/>
-              </a:rPr>
-              <a:t>git</a:t>
-            </a:r>
-            <a:r>
-              <a:rPr lang="nb-NO" sz="2000" b="1" dirty="0" smtClean="0">
-                <a:latin typeface="Courier New" panose="02070309020205020404" pitchFamily="49" charset="0"/>
-                <a:cs typeface="Courier New" panose="02070309020205020404" pitchFamily="49" charset="0"/>
-              </a:rPr>
-              <a:t> </a:t>
-            </a:r>
-            <a:r>
-              <a:rPr lang="nb-NO" sz="2000" b="1" dirty="0" err="1" smtClean="0">
-                <a:latin typeface="Courier New" panose="02070309020205020404" pitchFamily="49" charset="0"/>
-                <a:cs typeface="Courier New" panose="02070309020205020404" pitchFamily="49" charset="0"/>
-              </a:rPr>
-              <a:t>clone</a:t>
-            </a:r>
-            <a:r>
-              <a:rPr lang="nb-NO" sz="2000" b="1" dirty="0">
-                <a:latin typeface="Courier New" panose="02070309020205020404" pitchFamily="49" charset="0"/>
-                <a:cs typeface="Courier New" panose="02070309020205020404" pitchFamily="49" charset="0"/>
-              </a:rPr>
-              <a:t> https://</a:t>
-            </a:r>
-            <a:r>
-              <a:rPr lang="nb-NO" sz="2000" b="1" dirty="0" smtClean="0">
-                <a:latin typeface="Courier New" panose="02070309020205020404" pitchFamily="49" charset="0"/>
-                <a:cs typeface="Courier New" panose="02070309020205020404" pitchFamily="49" charset="0"/>
-              </a:rPr>
-              <a:t>github.com/bouvet/solid-1.git</a:t>
-            </a:r>
-          </a:p>
-          <a:p>
-            <a:pPr marL="0" indent="0">
-              <a:buNone/>
-            </a:pPr>
-            <a:endParaRPr lang="nb-NO" sz="2000" b="1" dirty="0" smtClean="0">
-              <a:latin typeface="Courier New" panose="02070309020205020404" pitchFamily="49" charset="0"/>
-              <a:cs typeface="Courier New" panose="02070309020205020404" pitchFamily="49" charset="0"/>
-            </a:endParaRPr>
-          </a:p>
-        </p:txBody>
-      </p:sp>
-      <p:sp>
-        <p:nvSpPr>
-          <p:cNvPr id="3" name="Plassholder for lysbildenummer 2"/>
-          <p:cNvSpPr>
-            <a:spLocks noGrp="1"/>
-          </p:cNvSpPr>
-          <p:nvPr>
-            <p:ph type="sldNum" sz="quarter" idx="11"/>
-          </p:nvPr>
-        </p:nvSpPr>
-        <p:spPr/>
-        <p:txBody>
-          <a:bodyPr/>
-          <a:lstStyle/>
-          <a:p>
-            <a:fld id="{6C43C368-B4F5-3E41-AC60-B61C23CF3503}" type="slidenum">
-              <a:rPr lang="en-US" smtClean="0"/>
-              <a:pPr/>
-              <a:t>22</a:t>
-            </a:fld>
-            <a:endParaRPr lang="en-US" dirty="0"/>
-          </a:p>
-        </p:txBody>
-      </p:sp>
-      <p:sp>
-        <p:nvSpPr>
-          <p:cNvPr id="4" name="Tittel 3"/>
-          <p:cNvSpPr>
-            <a:spLocks noGrp="1"/>
-          </p:cNvSpPr>
-          <p:nvPr>
-            <p:ph type="title"/>
-          </p:nvPr>
-        </p:nvSpPr>
-        <p:spPr/>
-        <p:txBody>
-          <a:bodyPr/>
-          <a:lstStyle/>
-          <a:p>
-            <a:r>
-              <a:rPr lang="nb-NO" dirty="0" smtClean="0"/>
-              <a:t>Oppgaver</a:t>
-            </a:r>
-            <a:endParaRPr lang="nb-NO" dirty="0"/>
-          </a:p>
-        </p:txBody>
-      </p:sp>
-      <p:pic>
-        <p:nvPicPr>
-          <p:cNvPr id="5" name="Bilde 4"/>
-          <p:cNvPicPr>
-            <a:picLocks noChangeAspect="1"/>
-          </p:cNvPicPr>
-          <p:nvPr/>
-        </p:nvPicPr>
-        <p:blipFill>
-          <a:blip r:embed="rId3">
-            <a:extLst>
-              <a:ext uri="{28A0092B-C50C-407E-A947-70E740481C1C}">
-                <a14:useLocalDpi xmlns:a14="http://schemas.microsoft.com/office/drawing/2010/main" val="0"/>
-              </a:ext>
-            </a:extLst>
-          </a:blip>
-          <a:stretch>
-            <a:fillRect/>
-          </a:stretch>
-        </p:blipFill>
-        <p:spPr>
-          <a:xfrm>
-            <a:off x="5728073" y="2492896"/>
-            <a:ext cx="2394570" cy="3888432"/>
-          </a:xfrm>
-          <a:prstGeom prst="rect">
-            <a:avLst/>
-          </a:prstGeom>
-        </p:spPr>
-      </p:pic>
-    </p:spTree>
-    <p:extLst>
-      <p:ext uri="{BB962C8B-B14F-4D97-AF65-F5344CB8AC3E}">
-        <p14:creationId xmlns:p14="http://schemas.microsoft.com/office/powerpoint/2010/main" val="3321780270"/>
-      </p:ext>
-    </p:extLst>
-  </p:cSld>
-  <p:clrMapOvr>
-    <a:masterClrMapping/>
-  </p:clrMapOvr>
-  <p:timing>
-    <p:tnLst>
-      <p:par>
-        <p:cTn id="1" dur="indefinite" restart="never" nodeType="tmRoot"/>
-      </p:par>
-    </p:tnLst>
-  </p:timing>
-</p:sld>
-</file>
-
 <file path=ppt/slides/slide23.xml><?xml version="1.0" encoding="utf-8"?>
 <p:sld xmlns:a="http://schemas.openxmlformats.org/drawingml/2006/main" xmlns:r="http://schemas.openxmlformats.org/officeDocument/2006/relationships" xmlns:p="http://schemas.openxmlformats.org/presentationml/2006/main">
   <p:cSld>
@@ -10978,32 +11079,149 @@
           <a:chExt cx="0" cy="0"/>
         </a:xfrm>
       </p:grpSpPr>
+      <p:sp>
+        <p:nvSpPr>
+          <p:cNvPr id="2" name="Plassholder for innhold 1"/>
+          <p:cNvSpPr>
+            <a:spLocks noGrp="1"/>
+          </p:cNvSpPr>
+          <p:nvPr>
+            <p:ph idx="1"/>
+          </p:nvPr>
+        </p:nvSpPr>
+        <p:spPr>
+          <a:xfrm>
+            <a:off x="467545" y="1340768"/>
+            <a:ext cx="8280919" cy="5040559"/>
+          </a:xfrm>
+        </p:spPr>
+        <p:txBody>
+          <a:bodyPr>
+            <a:normAutofit/>
+          </a:bodyPr>
+          <a:lstStyle/>
+          <a:p>
+            <a:pPr marL="0" indent="0">
+              <a:buNone/>
+            </a:pPr>
+            <a:r>
+              <a:rPr lang="nb-NO" sz="2200" b="1" dirty="0" err="1" smtClean="0">
+                <a:latin typeface="Courier New" panose="02070309020205020404" pitchFamily="49" charset="0"/>
+                <a:cs typeface="Courier New" panose="02070309020205020404" pitchFamily="49" charset="0"/>
+              </a:rPr>
+              <a:t>git</a:t>
+            </a:r>
+            <a:r>
+              <a:rPr lang="nb-NO" sz="2200" b="1" dirty="0" smtClean="0">
+                <a:latin typeface="Courier New" panose="02070309020205020404" pitchFamily="49" charset="0"/>
+                <a:cs typeface="Courier New" panose="02070309020205020404" pitchFamily="49" charset="0"/>
+              </a:rPr>
+              <a:t> </a:t>
+            </a:r>
+            <a:r>
+              <a:rPr lang="nb-NO" sz="2200" b="1" dirty="0" err="1" smtClean="0">
+                <a:latin typeface="Courier New" panose="02070309020205020404" pitchFamily="49" charset="0"/>
+                <a:cs typeface="Courier New" panose="02070309020205020404" pitchFamily="49" charset="0"/>
+              </a:rPr>
+              <a:t>clone</a:t>
+            </a:r>
+            <a:r>
+              <a:rPr lang="nb-NO" sz="2200" b="1" dirty="0">
+                <a:latin typeface="Courier New" panose="02070309020205020404" pitchFamily="49" charset="0"/>
+                <a:cs typeface="Courier New" panose="02070309020205020404" pitchFamily="49" charset="0"/>
+              </a:rPr>
+              <a:t> https://</a:t>
+            </a:r>
+            <a:r>
+              <a:rPr lang="nb-NO" sz="2200" b="1" dirty="0" smtClean="0">
+                <a:latin typeface="Courier New" panose="02070309020205020404" pitchFamily="49" charset="0"/>
+                <a:cs typeface="Courier New" panose="02070309020205020404" pitchFamily="49" charset="0"/>
+              </a:rPr>
+              <a:t>github.com/bouvet/solid-1.git</a:t>
+            </a:r>
+          </a:p>
+          <a:p>
+            <a:pPr marL="0" indent="0">
+              <a:buNone/>
+            </a:pPr>
+            <a:endParaRPr lang="nb-NO" sz="2200" b="1" dirty="0" smtClean="0">
+              <a:latin typeface="Courier New" panose="02070309020205020404" pitchFamily="49" charset="0"/>
+              <a:cs typeface="Courier New" panose="02070309020205020404" pitchFamily="49" charset="0"/>
+            </a:endParaRPr>
+          </a:p>
+        </p:txBody>
+      </p:sp>
+      <p:sp>
+        <p:nvSpPr>
+          <p:cNvPr id="3" name="Plassholder for lysbildenummer 2"/>
+          <p:cNvSpPr>
+            <a:spLocks noGrp="1"/>
+          </p:cNvSpPr>
+          <p:nvPr>
+            <p:ph type="sldNum" sz="quarter" idx="11"/>
+          </p:nvPr>
+        </p:nvSpPr>
+        <p:spPr/>
+        <p:txBody>
+          <a:bodyPr/>
+          <a:lstStyle/>
+          <a:p>
+            <a:fld id="{6C43C368-B4F5-3E41-AC60-B61C23CF3503}" type="slidenum">
+              <a:rPr lang="en-US" smtClean="0"/>
+              <a:pPr/>
+              <a:t>23</a:t>
+            </a:fld>
+            <a:endParaRPr lang="en-US" dirty="0"/>
+          </a:p>
+        </p:txBody>
+      </p:sp>
+      <p:sp>
+        <p:nvSpPr>
+          <p:cNvPr id="4" name="Tittel 3"/>
+          <p:cNvSpPr>
+            <a:spLocks noGrp="1"/>
+          </p:cNvSpPr>
+          <p:nvPr>
+            <p:ph type="title"/>
+          </p:nvPr>
+        </p:nvSpPr>
+        <p:spPr/>
+        <p:txBody>
+          <a:bodyPr/>
+          <a:lstStyle/>
+          <a:p>
+            <a:r>
+              <a:rPr lang="nb-NO" dirty="0" smtClean="0"/>
+              <a:t>Kildekode for oppgaver</a:t>
+            </a:r>
+            <a:endParaRPr lang="nb-NO" dirty="0"/>
+          </a:p>
+        </p:txBody>
+      </p:sp>
       <p:pic>
         <p:nvPicPr>
-          <p:cNvPr id="6" name="Plassholder for innhold 5"/>
+          <p:cNvPr id="7" name="Picture 6"/>
           <p:cNvPicPr>
-            <a:picLocks noGrp="1" noChangeAspect="1"/>
+            <a:picLocks noChangeAspect="1"/>
           </p:cNvPicPr>
-          <p:nvPr>
-            <p:ph idx="1"/>
-          </p:nvPr>
+          <p:nvPr/>
         </p:nvPicPr>
         <p:blipFill>
-          <a:blip r:embed="rId2"/>
+          <a:blip r:embed="rId3"/>
           <a:stretch>
             <a:fillRect/>
           </a:stretch>
         </p:blipFill>
         <p:spPr>
           <a:xfrm>
-            <a:off x="1763688" y="1196752"/>
-            <a:ext cx="6264695" cy="5155165"/>
+            <a:off x="1547664" y="1887538"/>
+            <a:ext cx="6590760" cy="4421782"/>
           </a:xfrm>
           <a:prstGeom prst="rect">
             <a:avLst/>
           </a:prstGeom>
           <a:effectLst>
-            <a:outerShdw blurRad="152400" dist="38100" dir="2700000" sx="101000" sy="101000" algn="tl" rotWithShape="0">
+            <a:outerShdw blurRad="165100" dist="38100" dir="2700000" sx="101000" sy="101000" algn="tl" rotWithShape="0">
               <a:prstClr val="black">
                 <a:alpha val="40000"/>
               </a:prstClr>
@@ -11011,57 +11229,10 @@
           </a:effectLst>
         </p:spPr>
       </p:pic>
-      <p:sp>
-        <p:nvSpPr>
-          <p:cNvPr id="3" name="Plassholder for lysbildenummer 2"/>
-          <p:cNvSpPr>
-            <a:spLocks noGrp="1"/>
-          </p:cNvSpPr>
-          <p:nvPr>
-            <p:ph type="sldNum" sz="quarter" idx="11"/>
-          </p:nvPr>
-        </p:nvSpPr>
-        <p:spPr/>
-        <p:txBody>
-          <a:bodyPr/>
-          <a:lstStyle/>
-          <a:p>
-            <a:fld id="{6C43C368-B4F5-3E41-AC60-B61C23CF3503}" type="slidenum">
-              <a:rPr lang="en-US" smtClean="0"/>
-              <a:pPr/>
-              <a:t>23</a:t>
-            </a:fld>
-            <a:endParaRPr lang="en-US" dirty="0"/>
-          </a:p>
-        </p:txBody>
-      </p:sp>
-      <p:sp>
-        <p:nvSpPr>
-          <p:cNvPr id="4" name="Tittel 3"/>
-          <p:cNvSpPr>
-            <a:spLocks noGrp="1"/>
-          </p:cNvSpPr>
-          <p:nvPr>
-            <p:ph type="title"/>
-          </p:nvPr>
-        </p:nvSpPr>
-        <p:spPr/>
-        <p:txBody>
-          <a:bodyPr/>
-          <a:lstStyle/>
-          <a:p>
-            <a:r>
-              <a:rPr lang="nb-NO" dirty="0" smtClean="0"/>
-              <a:t>www.getpostman.com</a:t>
-            </a:r>
-            <a:endParaRPr lang="nb-NO" dirty="0"/>
-          </a:p>
-        </p:txBody>
-      </p:sp>
     </p:spTree>
     <p:extLst>
       <p:ext uri="{BB962C8B-B14F-4D97-AF65-F5344CB8AC3E}">
-        <p14:creationId xmlns:p14="http://schemas.microsoft.com/office/powerpoint/2010/main" val="2196954216"/>
+        <p14:creationId xmlns:p14="http://schemas.microsoft.com/office/powerpoint/2010/main" val="3321780270"/>
       </p:ext>
     </p:extLst>
   </p:cSld>
@@ -11095,70 +11266,39 @@
           <a:chExt cx="0" cy="0"/>
         </a:xfrm>
       </p:grpSpPr>
-      <p:sp>
-        <p:nvSpPr>
-          <p:cNvPr id="2" name="Plassholder for innhold 1"/>
-          <p:cNvSpPr>
-            <a:spLocks noGrp="1"/>
-          </p:cNvSpPr>
+      <p:pic>
+        <p:nvPicPr>
+          <p:cNvPr id="6" name="Plassholder for innhold 5"/>
+          <p:cNvPicPr>
+            <a:picLocks noGrp="1" noChangeAspect="1"/>
+          </p:cNvPicPr>
           <p:nvPr>
             <p:ph idx="1"/>
           </p:nvPr>
-        </p:nvSpPr>
-        <p:spPr/>
-        <p:txBody>
-          <a:bodyPr/>
-          <a:lstStyle/>
-          <a:p>
-            <a:r>
-              <a:rPr lang="nb-NO" dirty="0" smtClean="0"/>
-              <a:t>Ta utgangspunkt i prosjektet ‘Start’</a:t>
-            </a:r>
-          </a:p>
-          <a:p>
-            <a:r>
-              <a:rPr lang="nb-NO" dirty="0" err="1" smtClean="0"/>
-              <a:t>Refaktoriser</a:t>
-            </a:r>
-            <a:r>
-              <a:rPr lang="nb-NO" dirty="0" smtClean="0"/>
-              <a:t> slik at SRP overholdes</a:t>
-            </a:r>
-          </a:p>
-          <a:p>
-            <a:endParaRPr lang="nb-NO" dirty="0"/>
-          </a:p>
-          <a:p>
-            <a:r>
-              <a:rPr lang="nb-NO" dirty="0" smtClean="0"/>
-              <a:t>Tips:</a:t>
-            </a:r>
-            <a:endParaRPr lang="nb-NO" dirty="0"/>
-          </a:p>
-          <a:p>
-            <a:pPr lvl="1"/>
-            <a:r>
-              <a:rPr lang="nb-NO" dirty="0" smtClean="0"/>
-              <a:t>Du skal kun endre i </a:t>
-            </a:r>
-            <a:r>
-              <a:rPr lang="nb-NO" dirty="0" err="1" smtClean="0"/>
-              <a:t>OrderProcessor</a:t>
-            </a:r>
-            <a:r>
-              <a:rPr lang="nb-NO" dirty="0" smtClean="0"/>
-              <a:t>!</a:t>
-            </a:r>
-          </a:p>
-          <a:p>
-            <a:pPr lvl="1"/>
-            <a:r>
-              <a:rPr lang="nb-NO" dirty="0" smtClean="0"/>
-              <a:t>Skill ut de forskjellige oppgavene i separate klasser</a:t>
-            </a:r>
-          </a:p>
-        </p:txBody>
-      </p:sp>
+        </p:nvPicPr>
+        <p:blipFill>
+          <a:blip r:embed="rId2"/>
+          <a:stretch>
+            <a:fillRect/>
+          </a:stretch>
+        </p:blipFill>
+        <p:spPr>
+          <a:xfrm>
+            <a:off x="1763688" y="1196752"/>
+            <a:ext cx="6264695" cy="5155165"/>
+          </a:xfrm>
+          <a:prstGeom prst="rect">
+            <a:avLst/>
+          </a:prstGeom>
+          <a:effectLst>
+            <a:outerShdw blurRad="152400" dist="38100" dir="2700000" sx="101000" sy="101000" algn="tl" rotWithShape="0">
+              <a:prstClr val="black">
+                <a:alpha val="40000"/>
+              </a:prstClr>
+            </a:outerShdw>
+          </a:effectLst>
+        </p:spPr>
+      </p:pic>
       <p:sp>
         <p:nvSpPr>
           <p:cNvPr id="3" name="Plassholder for lysbildenummer 2"/>
@@ -11193,23 +11333,14 @@
             <p:ph type="title"/>
           </p:nvPr>
         </p:nvSpPr>
-        <p:spPr>
-          <a:xfrm>
-            <a:off x="467544" y="476250"/>
-            <a:ext cx="7848871" cy="1081088"/>
-          </a:xfrm>
-        </p:spPr>
+        <p:spPr/>
         <p:txBody>
           <a:bodyPr/>
           <a:lstStyle/>
           <a:p>
             <a:r>
               <a:rPr lang="nb-NO" dirty="0" smtClean="0"/>
-              <a:t>Oppgave 1 – Single </a:t>
-            </a:r>
-            <a:r>
-              <a:rPr lang="nb-NO" dirty="0" err="1" smtClean="0"/>
-              <a:t>Responsibility</a:t>
+              <a:t>www.getpostman.com</a:t>
             </a:r>
             <a:endParaRPr lang="nb-NO" dirty="0"/>
           </a:p>
@@ -11218,7 +11349,7 @@
     </p:spTree>
     <p:extLst>
       <p:ext uri="{BB962C8B-B14F-4D97-AF65-F5344CB8AC3E}">
-        <p14:creationId xmlns:p14="http://schemas.microsoft.com/office/powerpoint/2010/main" val="4187670669"/>
+        <p14:creationId xmlns:p14="http://schemas.microsoft.com/office/powerpoint/2010/main" val="2196954216"/>
       </p:ext>
     </p:extLst>
   </p:cSld>
@@ -11254,7 +11385,71 @@
       </p:grpSpPr>
       <p:sp>
         <p:nvSpPr>
-          <p:cNvPr id="3" name="Slide Number Placeholder 2"/>
+          <p:cNvPr id="2" name="Plassholder for innhold 1"/>
+          <p:cNvSpPr>
+            <a:spLocks noGrp="1"/>
+          </p:cNvSpPr>
+          <p:nvPr>
+            <p:ph idx="1"/>
+          </p:nvPr>
+        </p:nvSpPr>
+        <p:spPr/>
+        <p:txBody>
+          <a:bodyPr/>
+          <a:lstStyle/>
+          <a:p>
+            <a:r>
+              <a:rPr lang="nb-NO" dirty="0" smtClean="0"/>
+              <a:t>Ta utgangspunkt i prosjektet ‘Start’</a:t>
+            </a:r>
+          </a:p>
+          <a:p>
+            <a:r>
+              <a:rPr lang="nb-NO" dirty="0" err="1" smtClean="0"/>
+              <a:t>Refaktoriser</a:t>
+            </a:r>
+            <a:r>
+              <a:rPr lang="nb-NO" dirty="0" smtClean="0"/>
+              <a:t> slik at SRP overholdes</a:t>
+            </a:r>
+          </a:p>
+          <a:p>
+            <a:endParaRPr lang="nb-NO" dirty="0"/>
+          </a:p>
+          <a:p>
+            <a:r>
+              <a:rPr lang="nb-NO" dirty="0" smtClean="0"/>
+              <a:t>Tips:</a:t>
+            </a:r>
+            <a:endParaRPr lang="nb-NO" dirty="0"/>
+          </a:p>
+          <a:p>
+            <a:pPr lvl="1"/>
+            <a:r>
+              <a:rPr lang="nb-NO" dirty="0" smtClean="0"/>
+              <a:t>Du skal kun endre i </a:t>
+            </a:r>
+            <a:r>
+              <a:rPr lang="nb-NO" dirty="0" err="1" smtClean="0"/>
+              <a:t>OrderProcessor</a:t>
+            </a:r>
+            <a:r>
+              <a:rPr lang="nb-NO" dirty="0" smtClean="0"/>
+              <a:t>!</a:t>
+            </a:r>
+          </a:p>
+          <a:p>
+            <a:pPr lvl="1"/>
+            <a:r>
+              <a:rPr lang="nb-NO" dirty="0" smtClean="0"/>
+              <a:t>Skill ut de forskjellige oppgavene i separate klasser</a:t>
+            </a:r>
+          </a:p>
+        </p:txBody>
+      </p:sp>
+      <p:sp>
+        <p:nvSpPr>
+          <p:cNvPr id="3" name="Plassholder for lysbildenummer 2"/>
           <p:cNvSpPr>
             <a:spLocks noGrp="1"/>
           </p:cNvSpPr>
@@ -11271,6 +11466,99 @@
               <a:rPr lang="en-US" smtClean="0"/>
               <a:pPr/>
               <a:t>25</a:t>
+            </a:fld>
+            <a:endParaRPr lang="en-US" dirty="0"/>
+          </a:p>
+        </p:txBody>
+      </p:sp>
+      <p:sp>
+        <p:nvSpPr>
+          <p:cNvPr id="4" name="Tittel 3"/>
+          <p:cNvSpPr>
+            <a:spLocks noGrp="1"/>
+          </p:cNvSpPr>
+          <p:nvPr>
+            <p:ph type="title"/>
+          </p:nvPr>
+        </p:nvSpPr>
+        <p:spPr>
+          <a:xfrm>
+            <a:off x="467544" y="476250"/>
+            <a:ext cx="7848871" cy="1081088"/>
+          </a:xfrm>
+        </p:spPr>
+        <p:txBody>
+          <a:bodyPr/>
+          <a:lstStyle/>
+          <a:p>
+            <a:r>
+              <a:rPr lang="nb-NO" dirty="0" smtClean="0"/>
+              <a:t>Oppgave 1 – Single </a:t>
+            </a:r>
+            <a:r>
+              <a:rPr lang="nb-NO" dirty="0" err="1" smtClean="0"/>
+              <a:t>Responsibility</a:t>
+            </a:r>
+            <a:endParaRPr lang="nb-NO" dirty="0"/>
+          </a:p>
+        </p:txBody>
+      </p:sp>
+    </p:spTree>
+    <p:extLst>
+      <p:ext uri="{BB962C8B-B14F-4D97-AF65-F5344CB8AC3E}">
+        <p14:creationId xmlns:p14="http://schemas.microsoft.com/office/powerpoint/2010/main" val="4187670669"/>
+      </p:ext>
+    </p:extLst>
+  </p:cSld>
+  <p:clrMapOvr>
+    <a:masterClrMapping/>
+  </p:clrMapOvr>
+  <p:timing>
+    <p:tnLst>
+      <p:par>
+        <p:cTn id="1" dur="indefinite" restart="never" nodeType="tmRoot"/>
+      </p:par>
+    </p:tnLst>
+  </p:timing>
+</p:sld>
+</file>
+
+<file path=ppt/slides/slide26.xml><?xml version="1.0" encoding="utf-8"?>
+<p:sld xmlns:a="http://schemas.openxmlformats.org/drawingml/2006/main" xmlns:r="http://schemas.openxmlformats.org/officeDocument/2006/relationships" xmlns:p="http://schemas.openxmlformats.org/presentationml/2006/main">
+  <p:cSld>
+    <p:spTree>
+      <p:nvGrpSpPr>
+        <p:cNvPr id="1" name=""/>
+        <p:cNvGrpSpPr/>
+        <p:nvPr/>
+      </p:nvGrpSpPr>
+      <p:grpSpPr>
+        <a:xfrm>
+          <a:off x="0" y="0"/>
+          <a:ext cx="0" cy="0"/>
+          <a:chOff x="0" y="0"/>
+          <a:chExt cx="0" cy="0"/>
+        </a:xfrm>
+      </p:grpSpPr>
+      <p:sp>
+        <p:nvSpPr>
+          <p:cNvPr id="3" name="Slide Number Placeholder 2"/>
+          <p:cNvSpPr>
+            <a:spLocks noGrp="1"/>
+          </p:cNvSpPr>
+          <p:nvPr>
+            <p:ph type="sldNum" sz="quarter" idx="11"/>
+          </p:nvPr>
+        </p:nvSpPr>
+        <p:spPr/>
+        <p:txBody>
+          <a:bodyPr/>
+          <a:lstStyle/>
+          <a:p>
+            <a:fld id="{6C43C368-B4F5-3E41-AC60-B61C23CF3503}" type="slidenum">
+              <a:rPr lang="en-US" smtClean="0"/>
+              <a:pPr/>
+              <a:t>26</a:t>
             </a:fld>
             <a:endParaRPr lang="en-US" dirty="0"/>
           </a:p>
@@ -11347,140 +11635,6 @@
   <p:clrMapOvr>
     <a:masterClrMapping/>
   </p:clrMapOvr>
-</p:sld>
-</file>
-
-<file path=ppt/slides/slide26.xml><?xml version="1.0" encoding="utf-8"?>
-<p:sld xmlns:a="http://schemas.openxmlformats.org/drawingml/2006/main" xmlns:r="http://schemas.openxmlformats.org/officeDocument/2006/relationships" xmlns:p="http://schemas.openxmlformats.org/presentationml/2006/main">
-  <p:cSld>
-    <p:spTree>
-      <p:nvGrpSpPr>
-        <p:cNvPr id="1" name=""/>
-        <p:cNvGrpSpPr/>
-        <p:nvPr/>
-      </p:nvGrpSpPr>
-      <p:grpSpPr>
-        <a:xfrm>
-          <a:off x="0" y="0"/>
-          <a:ext cx="0" cy="0"/>
-          <a:chOff x="0" y="0"/>
-          <a:chExt cx="0" cy="0"/>
-        </a:xfrm>
-      </p:grpSpPr>
-      <p:sp>
-        <p:nvSpPr>
-          <p:cNvPr id="2" name="Plassholder for innhold 1"/>
-          <p:cNvSpPr>
-            <a:spLocks noGrp="1"/>
-          </p:cNvSpPr>
-          <p:nvPr>
-            <p:ph idx="1"/>
-          </p:nvPr>
-        </p:nvSpPr>
-        <p:spPr/>
-        <p:txBody>
-          <a:bodyPr/>
-          <a:lstStyle/>
-          <a:p>
-            <a:r>
-              <a:rPr lang="nb-NO" dirty="0" smtClean="0"/>
-              <a:t>Ta utgangspunkt i prosjektet ‘Refactor1’</a:t>
-            </a:r>
-          </a:p>
-          <a:p>
-            <a:pPr lvl="1"/>
-            <a:r>
-              <a:rPr lang="nb-NO" dirty="0" smtClean="0"/>
-              <a:t>(som er «fasit» for oppgave 1)</a:t>
-            </a:r>
-          </a:p>
-          <a:p>
-            <a:r>
-              <a:rPr lang="nb-NO" dirty="0" err="1" smtClean="0"/>
-              <a:t>Refaktoriser</a:t>
-            </a:r>
-            <a:r>
-              <a:rPr lang="nb-NO" dirty="0" smtClean="0"/>
-              <a:t> slik at DIP overholdes</a:t>
-            </a:r>
-            <a:endParaRPr lang="nb-NO" dirty="0"/>
-          </a:p>
-        </p:txBody>
-      </p:sp>
-      <p:sp>
-        <p:nvSpPr>
-          <p:cNvPr id="3" name="Plassholder for lysbildenummer 2"/>
-          <p:cNvSpPr>
-            <a:spLocks noGrp="1"/>
-          </p:cNvSpPr>
-          <p:nvPr>
-            <p:ph type="sldNum" sz="quarter" idx="11"/>
-          </p:nvPr>
-        </p:nvSpPr>
-        <p:spPr/>
-        <p:txBody>
-          <a:bodyPr/>
-          <a:lstStyle/>
-          <a:p>
-            <a:fld id="{6C43C368-B4F5-3E41-AC60-B61C23CF3503}" type="slidenum">
-              <a:rPr lang="en-US" smtClean="0"/>
-              <a:pPr/>
-              <a:t>26</a:t>
-            </a:fld>
-            <a:endParaRPr lang="en-US" dirty="0"/>
-          </a:p>
-        </p:txBody>
-      </p:sp>
-      <p:sp>
-        <p:nvSpPr>
-          <p:cNvPr id="4" name="Tittel 3"/>
-          <p:cNvSpPr>
-            <a:spLocks noGrp="1"/>
-          </p:cNvSpPr>
-          <p:nvPr>
-            <p:ph type="title"/>
-          </p:nvPr>
-        </p:nvSpPr>
-        <p:spPr>
-          <a:xfrm>
-            <a:off x="467544" y="476250"/>
-            <a:ext cx="7776863" cy="1081088"/>
-          </a:xfrm>
-        </p:spPr>
-        <p:txBody>
-          <a:bodyPr/>
-          <a:lstStyle/>
-          <a:p>
-            <a:r>
-              <a:rPr lang="nb-NO" dirty="0" smtClean="0"/>
-              <a:t>Oppgave 2 – </a:t>
-            </a:r>
-            <a:r>
-              <a:rPr lang="nb-NO" dirty="0" err="1" smtClean="0"/>
-              <a:t>Dependency</a:t>
-            </a:r>
-            <a:r>
-              <a:rPr lang="nb-NO" dirty="0" smtClean="0"/>
-              <a:t> </a:t>
-            </a:r>
-            <a:r>
-              <a:rPr lang="nb-NO" dirty="0" err="1" smtClean="0"/>
-              <a:t>Inversion</a:t>
-            </a:r>
-            <a:endParaRPr lang="nb-NO" dirty="0"/>
-          </a:p>
-        </p:txBody>
-      </p:sp>
-    </p:spTree>
-    <p:extLst>
-      <p:ext uri="{BB962C8B-B14F-4D97-AF65-F5344CB8AC3E}">
-        <p14:creationId xmlns:p14="http://schemas.microsoft.com/office/powerpoint/2010/main" val="2517971211"/>
-      </p:ext>
-    </p:extLst>
-  </p:cSld>
-  <p:clrMapOvr>
-    <a:masterClrMapping/>
-  </p:clrMapOvr>
   <p:timing>
     <p:tnLst>
       <p:par>
@@ -11510,7 +11664,47 @@
       </p:grpSpPr>
       <p:sp>
         <p:nvSpPr>
-          <p:cNvPr id="3" name="Slide Number Placeholder 2"/>
+          <p:cNvPr id="2" name="Plassholder for innhold 1"/>
+          <p:cNvSpPr>
+            <a:spLocks noGrp="1"/>
+          </p:cNvSpPr>
+          <p:nvPr>
+            <p:ph idx="1"/>
+          </p:nvPr>
+        </p:nvSpPr>
+        <p:spPr/>
+        <p:txBody>
+          <a:bodyPr/>
+          <a:lstStyle/>
+          <a:p>
+            <a:r>
+              <a:rPr lang="nb-NO" dirty="0" smtClean="0"/>
+              <a:t>Ta utgangspunkt i prosjektet ‘Refactor1’</a:t>
+            </a:r>
+          </a:p>
+          <a:p>
+            <a:pPr lvl="1"/>
+            <a:r>
+              <a:rPr lang="nb-NO" dirty="0" smtClean="0"/>
+              <a:t>(som er «fasit» for oppgave 1)</a:t>
+            </a:r>
+          </a:p>
+          <a:p>
+            <a:r>
+              <a:rPr lang="nb-NO" dirty="0" err="1" smtClean="0"/>
+              <a:t>Refaktoriser</a:t>
+            </a:r>
+            <a:r>
+              <a:rPr lang="nb-NO" dirty="0" smtClean="0"/>
+              <a:t> slik at DIP overholdes</a:t>
+            </a:r>
+            <a:endParaRPr lang="nb-NO" dirty="0"/>
+          </a:p>
+        </p:txBody>
+      </p:sp>
+      <p:sp>
+        <p:nvSpPr>
+          <p:cNvPr id="3" name="Plassholder for lysbildenummer 2"/>
           <p:cNvSpPr>
             <a:spLocks noGrp="1"/>
           </p:cNvSpPr>
@@ -11534,6 +11728,107 @@
       </p:sp>
       <p:sp>
         <p:nvSpPr>
+          <p:cNvPr id="4" name="Tittel 3"/>
+          <p:cNvSpPr>
+            <a:spLocks noGrp="1"/>
+          </p:cNvSpPr>
+          <p:nvPr>
+            <p:ph type="title"/>
+          </p:nvPr>
+        </p:nvSpPr>
+        <p:spPr>
+          <a:xfrm>
+            <a:off x="467544" y="476250"/>
+            <a:ext cx="7776863" cy="1081088"/>
+          </a:xfrm>
+        </p:spPr>
+        <p:txBody>
+          <a:bodyPr/>
+          <a:lstStyle/>
+          <a:p>
+            <a:r>
+              <a:rPr lang="nb-NO" dirty="0" smtClean="0"/>
+              <a:t>Oppgave 2 – </a:t>
+            </a:r>
+            <a:r>
+              <a:rPr lang="nb-NO" dirty="0" err="1" smtClean="0"/>
+              <a:t>Dependency</a:t>
+            </a:r>
+            <a:r>
+              <a:rPr lang="nb-NO" dirty="0" smtClean="0"/>
+              <a:t> </a:t>
+            </a:r>
+            <a:r>
+              <a:rPr lang="nb-NO" dirty="0" err="1" smtClean="0"/>
+              <a:t>Inversion</a:t>
+            </a:r>
+            <a:endParaRPr lang="nb-NO" dirty="0"/>
+          </a:p>
+        </p:txBody>
+      </p:sp>
+    </p:spTree>
+    <p:extLst>
+      <p:ext uri="{BB962C8B-B14F-4D97-AF65-F5344CB8AC3E}">
+        <p14:creationId xmlns:p14="http://schemas.microsoft.com/office/powerpoint/2010/main" val="2517971211"/>
+      </p:ext>
+    </p:extLst>
+  </p:cSld>
+  <p:clrMapOvr>
+    <a:masterClrMapping/>
+  </p:clrMapOvr>
+  <p:timing>
+    <p:tnLst>
+      <p:par>
+        <p:cTn id="1" dur="indefinite" restart="never" nodeType="tmRoot"/>
+      </p:par>
+    </p:tnLst>
+  </p:timing>
+</p:sld>
+</file>
+
+<file path=ppt/slides/slide28.xml><?xml version="1.0" encoding="utf-8"?>
+<p:sld xmlns:a="http://schemas.openxmlformats.org/drawingml/2006/main" xmlns:r="http://schemas.openxmlformats.org/officeDocument/2006/relationships" xmlns:p="http://schemas.openxmlformats.org/presentationml/2006/main">
+  <p:cSld>
+    <p:spTree>
+      <p:nvGrpSpPr>
+        <p:cNvPr id="1" name=""/>
+        <p:cNvGrpSpPr/>
+        <p:nvPr/>
+      </p:nvGrpSpPr>
+      <p:grpSpPr>
+        <a:xfrm>
+          <a:off x="0" y="0"/>
+          <a:ext cx="0" cy="0"/>
+          <a:chOff x="0" y="0"/>
+          <a:chExt cx="0" cy="0"/>
+        </a:xfrm>
+      </p:grpSpPr>
+      <p:sp>
+        <p:nvSpPr>
+          <p:cNvPr id="3" name="Slide Number Placeholder 2"/>
+          <p:cNvSpPr>
+            <a:spLocks noGrp="1"/>
+          </p:cNvSpPr>
+          <p:nvPr>
+            <p:ph type="sldNum" sz="quarter" idx="11"/>
+          </p:nvPr>
+        </p:nvSpPr>
+        <p:spPr/>
+        <p:txBody>
+          <a:bodyPr/>
+          <a:lstStyle/>
+          <a:p>
+            <a:fld id="{6C43C368-B4F5-3E41-AC60-B61C23CF3503}" type="slidenum">
+              <a:rPr lang="en-US" smtClean="0"/>
+              <a:pPr/>
+              <a:t>28</a:t>
+            </a:fld>
+            <a:endParaRPr lang="en-US" dirty="0"/>
+          </a:p>
+        </p:txBody>
+      </p:sp>
+      <p:sp>
+        <p:nvSpPr>
           <p:cNvPr id="4" name="Title 3"/>
           <p:cNvSpPr>
             <a:spLocks noGrp="1"/>
@@ -11557,11 +11852,7 @@
             </a:r>
             <a:r>
               <a:rPr lang="nb-NO" dirty="0" smtClean="0"/>
-              <a:t> – </a:t>
-            </a:r>
-            <a:r>
-              <a:rPr lang="nb-NO" dirty="0" smtClean="0"/>
-              <a:t>DI (C#)</a:t>
+              <a:t> – DI (C#)</a:t>
             </a:r>
             <a:endParaRPr lang="nb-NO" dirty="0"/>
           </a:p>
@@ -11589,7 +11880,7 @@
         </p:blipFill>
         <p:spPr>
           <a:xfrm>
-            <a:off x="0" y="925497"/>
+            <a:off x="0" y="1302314"/>
             <a:ext cx="9144000" cy="5007006"/>
           </a:xfrm>
           <a:prstGeom prst="rect">
@@ -11607,6 +11898,13 @@
   <p:clrMapOvr>
     <a:masterClrMapping/>
   </p:clrMapOvr>
+  <p:timing>
+    <p:tnLst>
+      <p:par>
+        <p:cTn id="1" dur="indefinite" restart="never" nodeType="tmRoot"/>
+      </p:par>
+    </p:tnLst>
+  </p:timing>
 </p:sld>
 </file>
 
@@ -11705,23 +12003,57 @@
           <a:p>
             <a:r>
               <a:rPr lang="nb-NO" dirty="0" smtClean="0"/>
-              <a:t>Robert C. Martin – «Design </a:t>
-            </a:r>
-            <a:r>
-              <a:rPr lang="nb-NO" dirty="0" err="1" smtClean="0"/>
+              <a:t>Bertrand Meyer – </a:t>
+            </a:r>
+            <a:r>
+              <a:rPr lang="nb-NO" i="1" dirty="0" smtClean="0"/>
+              <a:t>«Object </a:t>
+            </a:r>
+            <a:r>
+              <a:rPr lang="nb-NO" i="1" dirty="0" err="1" smtClean="0"/>
+              <a:t>Oriented</a:t>
+            </a:r>
+            <a:r>
+              <a:rPr lang="nb-NO" i="1" dirty="0" smtClean="0"/>
+              <a:t> Software Construction»</a:t>
+            </a:r>
+            <a:r>
+              <a:rPr lang="nb-NO" dirty="0" smtClean="0"/>
+              <a:t> (1988)</a:t>
+            </a:r>
+          </a:p>
+          <a:p>
+            <a:r>
+              <a:rPr lang="nb-NO" dirty="0" smtClean="0"/>
+              <a:t>Robert </a:t>
+            </a:r>
+            <a:r>
+              <a:rPr lang="nb-NO" dirty="0" smtClean="0"/>
+              <a:t>C. Martin – </a:t>
+            </a:r>
+            <a:r>
+              <a:rPr lang="nb-NO" i="1" dirty="0" smtClean="0"/>
+              <a:t>«Design </a:t>
+            </a:r>
+            <a:r>
+              <a:rPr lang="nb-NO" i="1" dirty="0" err="1" smtClean="0"/>
               <a:t>Principles</a:t>
             </a:r>
             <a:r>
+              <a:rPr lang="nb-NO" i="1" dirty="0" smtClean="0"/>
+              <a:t> and Design </a:t>
+            </a:r>
+            <a:r>
+              <a:rPr lang="nb-NO" i="1" dirty="0" err="1" smtClean="0"/>
+              <a:t>Patterns</a:t>
+            </a:r>
+            <a:r>
+              <a:rPr lang="nb-NO" i="1" dirty="0" smtClean="0"/>
+              <a:t>» </a:t>
+            </a:r>
+            <a:r>
               <a:rPr lang="nb-NO" dirty="0" smtClean="0"/>
-              <a:t> and Design </a:t>
-            </a:r>
-            <a:r>
-              <a:rPr lang="nb-NO" dirty="0" err="1" smtClean="0"/>
-              <a:t>Patterns</a:t>
-            </a:r>
-            <a:r>
-              <a:rPr lang="nb-NO" dirty="0" smtClean="0"/>
-              <a:t>» (2000)</a:t>
+              <a:t>(2000)</a:t>
             </a:r>
           </a:p>
           <a:p>
@@ -13123,8 +13455,8 @@
         </p:nvSpPr>
         <p:spPr>
           <a:xfrm>
-            <a:off x="1403647" y="476250"/>
-            <a:ext cx="6408713" cy="5905078"/>
+            <a:off x="251520" y="476250"/>
+            <a:ext cx="8640959" cy="5905078"/>
           </a:xfrm>
         </p:spPr>
         <p:txBody>
@@ -13135,63 +13467,63 @@
           <a:p>
             <a:pPr algn="ctr"/>
             <a:r>
-              <a:rPr lang="nb-NO" sz="2800" dirty="0"/>
+              <a:rPr lang="nb-NO" dirty="0"/>
               <a:t>«A </a:t>
             </a:r>
             <a:r>
-              <a:rPr lang="nb-NO" sz="2800" dirty="0" err="1"/>
+              <a:rPr lang="nb-NO" dirty="0" err="1"/>
               <a:t>class</a:t>
             </a:r>
             <a:r>
-              <a:rPr lang="nb-NO" sz="2800" dirty="0"/>
+              <a:rPr lang="nb-NO" dirty="0"/>
               <a:t> </a:t>
             </a:r>
             <a:r>
-              <a:rPr lang="nb-NO" sz="2800" dirty="0" err="1"/>
+              <a:rPr lang="nb-NO" dirty="0" err="1"/>
               <a:t>should</a:t>
             </a:r>
             <a:r>
-              <a:rPr lang="nb-NO" sz="2800" dirty="0"/>
+              <a:rPr lang="nb-NO" dirty="0"/>
               <a:t> have </a:t>
             </a:r>
             <a:r>
-              <a:rPr lang="nb-NO" sz="2800" dirty="0" err="1"/>
+              <a:rPr lang="nb-NO" dirty="0" err="1"/>
               <a:t>one</a:t>
             </a:r>
             <a:r>
-              <a:rPr lang="nb-NO" sz="2800" dirty="0"/>
+              <a:rPr lang="nb-NO" dirty="0"/>
               <a:t>, and </a:t>
             </a:r>
             <a:r>
-              <a:rPr lang="nb-NO" sz="2800" dirty="0" err="1"/>
+              <a:rPr lang="nb-NO" dirty="0" err="1"/>
               <a:t>only</a:t>
             </a:r>
             <a:r>
-              <a:rPr lang="nb-NO" sz="2800" dirty="0"/>
+              <a:rPr lang="nb-NO" dirty="0"/>
               <a:t> </a:t>
             </a:r>
             <a:r>
-              <a:rPr lang="nb-NO" sz="2800" dirty="0" err="1"/>
+              <a:rPr lang="nb-NO" dirty="0" err="1"/>
               <a:t>one</a:t>
             </a:r>
             <a:r>
-              <a:rPr lang="nb-NO" sz="2800" dirty="0"/>
+              <a:rPr lang="nb-NO" dirty="0"/>
               <a:t>, </a:t>
             </a:r>
             <a:r>
-              <a:rPr lang="nb-NO" sz="2800" dirty="0" err="1"/>
+              <a:rPr lang="nb-NO" dirty="0" err="1"/>
               <a:t>reason</a:t>
             </a:r>
             <a:r>
-              <a:rPr lang="nb-NO" sz="2800" dirty="0"/>
+              <a:rPr lang="nb-NO" dirty="0"/>
               <a:t> to </a:t>
             </a:r>
             <a:r>
-              <a:rPr lang="nb-NO" sz="2800" dirty="0" err="1"/>
+              <a:rPr lang="nb-NO" dirty="0" err="1"/>
               <a:t>change</a:t>
             </a:r>
             <a:r>
-              <a:rPr lang="nb-NO" sz="2800" dirty="0"/>
+              <a:rPr lang="nb-NO" dirty="0"/>
               <a:t>»</a:t>
             </a:r>
           </a:p>
@@ -14427,15 +14759,6 @@
 
 <file path=customXml/item1.xml><?xml version="1.0" encoding="utf-8"?>
 <?mso-contentType ?>
-<FormTemplates xmlns="http://schemas.microsoft.com/sharepoint/v3/contenttype/forms">
-  <Display>DocumentLibraryForm</Display>
-  <Edit>DocumentLibraryForm</Edit>
-  <New>DocumentLibraryForm</New>
-</FormTemplates>
-</file>
-
-<file path=customXml/item2.xml><?xml version="1.0" encoding="utf-8"?>
-<?mso-contentType ?>
 <spe:Receivers xmlns:spe="http://schemas.microsoft.com/sharepoint/events">
   <Receiver>
     <Name>Document ID Generator</Name>
@@ -14480,7 +14803,30 @@
 </spe:Receivers>
 </file>
 
+<file path=customXml/item2.xml><?xml version="1.0" encoding="utf-8"?>
+<?mso-contentType ?>
+<FormTemplates xmlns="http://schemas.microsoft.com/sharepoint/v3/contenttype/forms">
+  <Display>DocumentLibraryForm</Display>
+  <Edit>DocumentLibraryForm</Edit>
+  <New>DocumentLibraryForm</New>
+</FormTemplates>
+</file>
+
 <file path=customXml/item3.xml><?xml version="1.0" encoding="utf-8"?>
+<p:properties xmlns:p="http://schemas.microsoft.com/office/2006/metadata/properties" xmlns:xsi="http://www.w3.org/2001/XMLSchema-instance" xmlns:pc="http://schemas.microsoft.com/office/infopath/2007/PartnerControls">
+  <documentManagement>
+    <_dlc_DocId xmlns="cd7095a3-97f1-4663-a71f-a762e9d8a5de">FK7UAMZMK7QV-3061-47</_dlc_DocId>
+    <_dlc_DocIdUrl xmlns="cd7095a3-97f1-4663-a71f-a762e9d8a5de">
+      <Url>https://pingvinen.bouvet.no/stotte/dokumentmaler/_layouts/DocIdRedir.aspx?ID=FK7UAMZMK7QV-3061-47</Url>
+      <Description>FK7UAMZMK7QV-3061-47</Description>
+    </_dlc_DocIdUrl>
+    <PublishingExpirationDate xmlns="http://schemas.microsoft.com/sharepoint/v3" xsi:nil="true"/>
+    <PublishingStartDate xmlns="http://schemas.microsoft.com/sharepoint/v3" xsi:nil="true"/>
+  </documentManagement>
+</p:properties>
+</file>
+
+<file path=customXml/item4.xml><?xml version="1.0" encoding="utf-8"?>
 <ct:contentTypeSchema xmlns:ct="http://schemas.microsoft.com/office/2006/metadata/contentType" xmlns:ma="http://schemas.microsoft.com/office/2006/metadata/properties/metaAttributes" ct:_="" ma:_="" ma:contentTypeName="Document" ma:contentTypeID="0x0101006DE77A4C69F7B04F983EB828CF8C5433" ma:contentTypeVersion="2" ma:contentTypeDescription="Create a new document." ma:contentTypeScope="" ma:versionID="3f88a36eb5d68a1319bea6a26a0634f9">
   <xsd:schema xmlns:xsd="http://www.w3.org/2001/XMLSchema" xmlns:xs="http://www.w3.org/2001/XMLSchema" xmlns:p="http://schemas.microsoft.com/office/2006/metadata/properties" xmlns:ns1="http://schemas.microsoft.com/sharepoint/v3" xmlns:ns2="cd7095a3-97f1-4663-a71f-a762e9d8a5de" targetNamespace="http://schemas.microsoft.com/office/2006/metadata/properties" ma:root="true" ma:fieldsID="12e73613dd42fd77c3af4275080e49b8" ns1:_="" ns2:_="">
     <xsd:import namespace="http://schemas.microsoft.com/sharepoint/v3"/>
@@ -14642,21 +14988,15 @@
 </ct:contentTypeSchema>
 </file>
 
-<file path=customXml/item4.xml><?xml version="1.0" encoding="utf-8"?>
-<p:properties xmlns:p="http://schemas.microsoft.com/office/2006/metadata/properties" xmlns:xsi="http://www.w3.org/2001/XMLSchema-instance" xmlns:pc="http://schemas.microsoft.com/office/infopath/2007/PartnerControls">
-  <documentManagement>
-    <_dlc_DocId xmlns="cd7095a3-97f1-4663-a71f-a762e9d8a5de">FK7UAMZMK7QV-3061-47</_dlc_DocId>
-    <_dlc_DocIdUrl xmlns="cd7095a3-97f1-4663-a71f-a762e9d8a5de">
-      <Url>https://pingvinen.bouvet.no/stotte/dokumentmaler/_layouts/DocIdRedir.aspx?ID=FK7UAMZMK7QV-3061-47</Url>
-      <Description>FK7UAMZMK7QV-3061-47</Description>
-    </_dlc_DocIdUrl>
-    <PublishingExpirationDate xmlns="http://schemas.microsoft.com/sharepoint/v3" xsi:nil="true"/>
-    <PublishingStartDate xmlns="http://schemas.microsoft.com/sharepoint/v3" xsi:nil="true"/>
-  </documentManagement>
-</p:properties>
+<file path=customXml/itemProps1.xml><?xml version="1.0" encoding="utf-8"?>
+<ds:datastoreItem xmlns:ds="http://schemas.openxmlformats.org/officeDocument/2006/customXml" ds:itemID="{95047315-98B4-402D-A094-92B291EC55D5}">
+  <ds:schemaRefs>
+    <ds:schemaRef ds:uri="http://schemas.microsoft.com/sharepoint/events"/>
+  </ds:schemaRefs>
+</ds:datastoreItem>
 </file>
 
-<file path=customXml/itemProps1.xml><?xml version="1.0" encoding="utf-8"?>
+<file path=customXml/itemProps2.xml><?xml version="1.0" encoding="utf-8"?>
 <ds:datastoreItem xmlns:ds="http://schemas.openxmlformats.org/officeDocument/2006/customXml" ds:itemID="{2AEC2C5E-0142-4DE9-A3D1-E1C3DD77BB73}">
   <ds:schemaRefs>
     <ds:schemaRef ds:uri="http://schemas.microsoft.com/sharepoint/v3/contenttype/forms"/>
@@ -14664,15 +15004,24 @@
 </ds:datastoreItem>
 </file>
 
-<file path=customXml/itemProps2.xml><?xml version="1.0" encoding="utf-8"?>
-<ds:datastoreItem xmlns:ds="http://schemas.openxmlformats.org/officeDocument/2006/customXml" ds:itemID="{95047315-98B4-402D-A094-92B291EC55D5}">
+<file path=customXml/itemProps3.xml><?xml version="1.0" encoding="utf-8"?>
+<ds:datastoreItem xmlns:ds="http://schemas.openxmlformats.org/officeDocument/2006/customXml" ds:itemID="{82784505-B6AE-42FB-A8A3-841C6312BFF2}">
   <ds:schemaRefs>
-    <ds:schemaRef ds:uri="http://schemas.microsoft.com/sharepoint/events"/>
+    <ds:schemaRef ds:uri="http://schemas.microsoft.com/office/2006/documentManagement/types"/>
+    <ds:schemaRef ds:uri="http://schemas.microsoft.com/office/infopath/2007/PartnerControls"/>
+    <ds:schemaRef ds:uri="cd7095a3-97f1-4663-a71f-a762e9d8a5de"/>
+    <ds:schemaRef ds:uri="http://purl.org/dc/elements/1.1/"/>
+    <ds:schemaRef ds:uri="http://schemas.microsoft.com/office/2006/metadata/properties"/>
+    <ds:schemaRef ds:uri="http://schemas.microsoft.com/sharepoint/v3"/>
+    <ds:schemaRef ds:uri="http://purl.org/dc/terms/"/>
+    <ds:schemaRef ds:uri="http://schemas.openxmlformats.org/package/2006/metadata/core-properties"/>
+    <ds:schemaRef ds:uri="http://www.w3.org/XML/1998/namespace"/>
+    <ds:schemaRef ds:uri="http://purl.org/dc/dcmitype/"/>
   </ds:schemaRefs>
 </ds:datastoreItem>
 </file>
 
-<file path=customXml/itemProps3.xml><?xml version="1.0" encoding="utf-8"?>
+<file path=customXml/itemProps4.xml><?xml version="1.0" encoding="utf-8"?>
 <ds:datastoreItem xmlns:ds="http://schemas.openxmlformats.org/officeDocument/2006/customXml" ds:itemID="{85C41887-34B0-475C-96EF-12649FBB6FA4}">
   <ds:schemaRefs>
     <ds:schemaRef ds:uri="http://schemas.microsoft.com/office/2006/metadata/contentType"/>
@@ -14687,23 +15036,6 @@
     <ds:schemaRef ds:uri="http://purl.org/dc/elements/1.1/"/>
     <ds:schemaRef ds:uri="http://purl.org/dc/terms/"/>
     <ds:schemaRef ds:uri="http://schemas.microsoft.com/internal/obd"/>
-  </ds:schemaRefs>
-</ds:datastoreItem>
-</file>
-
-<file path=customXml/itemProps4.xml><?xml version="1.0" encoding="utf-8"?>
-<ds:datastoreItem xmlns:ds="http://schemas.openxmlformats.org/officeDocument/2006/customXml" ds:itemID="{82784505-B6AE-42FB-A8A3-841C6312BFF2}">
-  <ds:schemaRefs>
-    <ds:schemaRef ds:uri="http://schemas.microsoft.com/office/2006/documentManagement/types"/>
-    <ds:schemaRef ds:uri="http://schemas.microsoft.com/office/infopath/2007/PartnerControls"/>
-    <ds:schemaRef ds:uri="cd7095a3-97f1-4663-a71f-a762e9d8a5de"/>
-    <ds:schemaRef ds:uri="http://purl.org/dc/elements/1.1/"/>
-    <ds:schemaRef ds:uri="http://schemas.microsoft.com/office/2006/metadata/properties"/>
-    <ds:schemaRef ds:uri="http://schemas.microsoft.com/sharepoint/v3"/>
-    <ds:schemaRef ds:uri="http://purl.org/dc/terms/"/>
-    <ds:schemaRef ds:uri="http://schemas.openxmlformats.org/package/2006/metadata/core-properties"/>
-    <ds:schemaRef ds:uri="http://www.w3.org/XML/1998/namespace"/>
-    <ds:schemaRef ds:uri="http://purl.org/dc/dcmitype/"/>
   </ds:schemaRefs>
 </ds:datastoreItem>
 </file>

</xml_diff>